<commit_message>
Add lecture's matherial for lesson 24 in ML Adv
</commit_message>
<xml_diff>
--- a/ML Adv/24 - Introduction in Bayes/24 - Introduction in Bayes lesson.pptx
+++ b/ML Adv/24 - Introduction in Bayes/24 - Introduction in Bayes lesson.pptx
@@ -30879,7 +30879,7 @@
                 </a:r>
                 <a:r>
                   <a:rPr lang="ru-RU" dirty="0"/>
-                  <a:t>работа на с </a:t>
+                  <a:t>работа не с </a:t>
                 </a:r>
                 <a14:m>
                   <m:oMath xmlns:m="http://schemas.openxmlformats.org/officeDocument/2006/math">
@@ -39953,7 +39953,7 @@
           <p:nvPr>
             <p:extLst>
               <p:ext uri="{D42A27DB-BD31-4B8C-83A1-F6EECF244321}">
-                <p14:modId xmlns:p14="http://schemas.microsoft.com/office/powerpoint/2010/main" val="4216938837"/>
+                <p14:modId xmlns:p14="http://schemas.microsoft.com/office/powerpoint/2010/main" val="122046190"/>
               </p:ext>
             </p:extLst>
           </p:nvPr>
@@ -40082,19 +40082,7 @@
                       </a:pPr>
                       <a:r>
                         <a:rPr lang="ru-RU" sz="1300" dirty="0"/>
-                        <a:t>Взять оценку </a:t>
-                      </a:r>
-                      <a:r>
-                        <a:rPr lang="en-US" sz="1300" dirty="0" err="1"/>
-                        <a:t>aposterior’a</a:t>
-                      </a:r>
-                      <a:r>
-                        <a:rPr lang="en-US" sz="1300" dirty="0"/>
-                        <a:t> c</a:t>
-                      </a:r>
-                      <a:r>
-                        <a:rPr lang="ru-RU" sz="1300" dirty="0"/>
-                        <a:t> нормальным распределением</a:t>
+                        <a:t>Решить задачи на условную вероятность и формулу Байеса</a:t>
                       </a:r>
                       <a:endParaRPr sz="1300" dirty="0"/>
                     </a:p>
@@ -42743,6 +42731,46 @@
               <a:buNone/>
             </a:pPr>
             <a:endParaRPr sz="1400" dirty="0"/>
+          </a:p>
+        </p:txBody>
+      </p:sp>
+      <p:sp>
+        <p:nvSpPr>
+          <p:cNvPr id="2" name="TextBox 1">
+            <a:extLst>
+              <a:ext uri="{FF2B5EF4-FFF2-40B4-BE49-F238E27FC236}">
+                <a16:creationId xmlns:a16="http://schemas.microsoft.com/office/drawing/2014/main" id="{574D5D25-4995-3D4C-AB4C-705D485081EC}"/>
+              </a:ext>
+            </a:extLst>
+          </p:cNvPr>
+          <p:cNvSpPr txBox="1"/>
+          <p:nvPr/>
+        </p:nvSpPr>
+        <p:spPr>
+          <a:xfrm>
+            <a:off x="781970" y="1633308"/>
+            <a:ext cx="2978701" cy="307777"/>
+          </a:xfrm>
+          <a:prstGeom prst="rect">
+            <a:avLst/>
+          </a:prstGeom>
+          <a:noFill/>
+        </p:spPr>
+        <p:txBody>
+          <a:bodyPr wrap="none" rtlCol="0">
+            <a:spAutoFit/>
+          </a:bodyPr>
+          <a:lstStyle/>
+          <a:p>
+            <a:r>
+              <a:rPr lang="ru-RU" dirty="0"/>
+              <a:t>07.08 </a:t>
+            </a:r>
+            <a:r>
+              <a:rPr lang="en-US" dirty="0"/>
+              <a:t>– Markov-Chain Monte-Carlo</a:t>
+            </a:r>
+            <a:endParaRPr lang="en-RU" dirty="0"/>
           </a:p>
         </p:txBody>
       </p:sp>

</xml_diff>

<commit_message>
Fix some for lesson 24 - Intro in Bayes
</commit_message>
<xml_diff>
--- a/ML Adv/24 - Introduction in Bayes/24 - Introduction in Bayes lesson.pptx
+++ b/ML Adv/24 - Introduction in Bayes/24 - Introduction in Bayes lesson.pptx
@@ -7,7 +7,7 @@
     <p:sldMasterId id="2147483692" r:id="rId3"/>
   </p:sldMasterIdLst>
   <p:notesMasterIdLst>
-    <p:notesMasterId r:id="rId44"/>
+    <p:notesMasterId r:id="rId45"/>
   </p:notesMasterIdLst>
   <p:sldIdLst>
     <p:sldId id="256" r:id="rId4"/>
@@ -30,47 +30,48 @@
     <p:sldId id="305" r:id="rId21"/>
     <p:sldId id="306" r:id="rId22"/>
     <p:sldId id="307" r:id="rId23"/>
-    <p:sldId id="267" r:id="rId24"/>
-    <p:sldId id="309" r:id="rId25"/>
-    <p:sldId id="310" r:id="rId26"/>
-    <p:sldId id="312" r:id="rId27"/>
-    <p:sldId id="313" r:id="rId28"/>
-    <p:sldId id="311" r:id="rId29"/>
-    <p:sldId id="268" r:id="rId30"/>
-    <p:sldId id="314" r:id="rId31"/>
-    <p:sldId id="316" r:id="rId32"/>
-    <p:sldId id="315" r:id="rId33"/>
-    <p:sldId id="275" r:id="rId34"/>
-    <p:sldId id="276" r:id="rId35"/>
-    <p:sldId id="278" r:id="rId36"/>
-    <p:sldId id="279" r:id="rId37"/>
-    <p:sldId id="280" r:id="rId38"/>
-    <p:sldId id="281" r:id="rId39"/>
-    <p:sldId id="282" r:id="rId40"/>
-    <p:sldId id="288" r:id="rId41"/>
-    <p:sldId id="289" r:id="rId42"/>
-    <p:sldId id="290" r:id="rId43"/>
+    <p:sldId id="317" r:id="rId24"/>
+    <p:sldId id="267" r:id="rId25"/>
+    <p:sldId id="309" r:id="rId26"/>
+    <p:sldId id="310" r:id="rId27"/>
+    <p:sldId id="312" r:id="rId28"/>
+    <p:sldId id="313" r:id="rId29"/>
+    <p:sldId id="311" r:id="rId30"/>
+    <p:sldId id="268" r:id="rId31"/>
+    <p:sldId id="314" r:id="rId32"/>
+    <p:sldId id="316" r:id="rId33"/>
+    <p:sldId id="315" r:id="rId34"/>
+    <p:sldId id="275" r:id="rId35"/>
+    <p:sldId id="276" r:id="rId36"/>
+    <p:sldId id="278" r:id="rId37"/>
+    <p:sldId id="279" r:id="rId38"/>
+    <p:sldId id="280" r:id="rId39"/>
+    <p:sldId id="281" r:id="rId40"/>
+    <p:sldId id="282" r:id="rId41"/>
+    <p:sldId id="288" r:id="rId42"/>
+    <p:sldId id="289" r:id="rId43"/>
+    <p:sldId id="290" r:id="rId44"/>
   </p:sldIdLst>
   <p:sldSz cx="9144000" cy="5143500" type="screen16x9"/>
   <p:notesSz cx="6858000" cy="9144000"/>
   <p:embeddedFontLst>
     <p:embeddedFont>
       <p:font typeface="Cambria Math" panose="02040503050406030204" pitchFamily="18" charset="0"/>
-      <p:regular r:id="rId45"/>
+      <p:regular r:id="rId46"/>
     </p:embeddedFont>
     <p:embeddedFont>
       <p:font typeface="Roboto" panose="02000000000000000000" pitchFamily="2" charset="0"/>
-      <p:regular r:id="rId46"/>
-      <p:bold r:id="rId47"/>
-      <p:italic r:id="rId48"/>
-      <p:boldItalic r:id="rId49"/>
+      <p:regular r:id="rId47"/>
+      <p:bold r:id="rId48"/>
+      <p:italic r:id="rId49"/>
+      <p:boldItalic r:id="rId50"/>
     </p:embeddedFont>
     <p:embeddedFont>
       <p:font typeface="Roboto" panose="02000000000000000000" pitchFamily="2" charset="0"/>
-      <p:regular r:id="rId46"/>
-      <p:bold r:id="rId47"/>
-      <p:italic r:id="rId48"/>
-      <p:boldItalic r:id="rId49"/>
+      <p:regular r:id="rId47"/>
+      <p:bold r:id="rId48"/>
+      <p:italic r:id="rId49"/>
+      <p:boldItalic r:id="rId50"/>
     </p:embeddedFont>
   </p:embeddedFontLst>
   <p:defaultTextStyle>
@@ -1072,6 +1073,11 @@
         </p:txBody>
       </p:sp>
     </p:spTree>
+    <p:extLst>
+      <p:ext uri="{BB962C8B-B14F-4D97-AF65-F5344CB8AC3E}">
+        <p14:creationId xmlns:p14="http://schemas.microsoft.com/office/powerpoint/2010/main" val="914152171"/>
+      </p:ext>
+    </p:extLst>
   </p:cSld>
   <p:clrMapOvr>
     <a:masterClrMapping/>
@@ -1176,11 +1182,6 @@
         </p:txBody>
       </p:sp>
     </p:spTree>
-    <p:extLst>
-      <p:ext uri="{BB962C8B-B14F-4D97-AF65-F5344CB8AC3E}">
-        <p14:creationId xmlns:p14="http://schemas.microsoft.com/office/powerpoint/2010/main" val="2220570507"/>
-      </p:ext>
-    </p:extLst>
   </p:cSld>
   <p:clrMapOvr>
     <a:masterClrMapping/>
@@ -1287,7 +1288,7 @@
     </p:spTree>
     <p:extLst>
       <p:ext uri="{BB962C8B-B14F-4D97-AF65-F5344CB8AC3E}">
-        <p14:creationId xmlns:p14="http://schemas.microsoft.com/office/powerpoint/2010/main" val="4254806390"/>
+        <p14:creationId xmlns:p14="http://schemas.microsoft.com/office/powerpoint/2010/main" val="2220570507"/>
       </p:ext>
     </p:extLst>
   </p:cSld>
@@ -1396,7 +1397,7 @@
     </p:spTree>
     <p:extLst>
       <p:ext uri="{BB962C8B-B14F-4D97-AF65-F5344CB8AC3E}">
-        <p14:creationId xmlns:p14="http://schemas.microsoft.com/office/powerpoint/2010/main" val="3792385079"/>
+        <p14:creationId xmlns:p14="http://schemas.microsoft.com/office/powerpoint/2010/main" val="4254806390"/>
       </p:ext>
     </p:extLst>
   </p:cSld>
@@ -1505,7 +1506,7 @@
     </p:spTree>
     <p:extLst>
       <p:ext uri="{BB962C8B-B14F-4D97-AF65-F5344CB8AC3E}">
-        <p14:creationId xmlns:p14="http://schemas.microsoft.com/office/powerpoint/2010/main" val="1916352082"/>
+        <p14:creationId xmlns:p14="http://schemas.microsoft.com/office/powerpoint/2010/main" val="3792385079"/>
       </p:ext>
     </p:extLst>
   </p:cSld>
@@ -1614,7 +1615,7 @@
     </p:spTree>
     <p:extLst>
       <p:ext uri="{BB962C8B-B14F-4D97-AF65-F5344CB8AC3E}">
-        <p14:creationId xmlns:p14="http://schemas.microsoft.com/office/powerpoint/2010/main" val="1454588247"/>
+        <p14:creationId xmlns:p14="http://schemas.microsoft.com/office/powerpoint/2010/main" val="1916352082"/>
       </p:ext>
     </p:extLst>
   </p:cSld>
@@ -1629,7 +1630,7 @@
   <p:cSld>
     <p:spTree>
       <p:nvGrpSpPr>
-        <p:cNvPr id="1" name="Shape 313"/>
+        <p:cNvPr id="1" name="Shape 306"/>
         <p:cNvGrpSpPr/>
         <p:nvPr/>
       </p:nvGrpSpPr>
@@ -1643,7 +1644,7 @@
       </p:grpSpPr>
       <p:sp>
         <p:nvSpPr>
-          <p:cNvPr id="314" name="Google Shape;314;g18740951071_0_77:notes"/>
+          <p:cNvPr id="307" name="Google Shape;307;gdf29b9fb24_0_69:notes"/>
           <p:cNvSpPr>
             <a:spLocks noGrp="1" noRot="1" noChangeAspect="1"/>
           </p:cNvSpPr>
@@ -1684,7 +1685,7 @@
       </p:sp>
       <p:sp>
         <p:nvSpPr>
-          <p:cNvPr id="315" name="Google Shape;315;g18740951071_0_77:notes"/>
+          <p:cNvPr id="308" name="Google Shape;308;gdf29b9fb24_0_69:notes"/>
           <p:cNvSpPr txBox="1">
             <a:spLocks noGrp="1"/>
           </p:cNvSpPr>
@@ -1721,6 +1722,11 @@
         </p:txBody>
       </p:sp>
     </p:spTree>
+    <p:extLst>
+      <p:ext uri="{BB962C8B-B14F-4D97-AF65-F5344CB8AC3E}">
+        <p14:creationId xmlns:p14="http://schemas.microsoft.com/office/powerpoint/2010/main" val="1454588247"/>
+      </p:ext>
+    </p:extLst>
   </p:cSld>
   <p:clrMapOvr>
     <a:masterClrMapping/>
@@ -1825,11 +1831,6 @@
         </p:txBody>
       </p:sp>
     </p:spTree>
-    <p:extLst>
-      <p:ext uri="{BB962C8B-B14F-4D97-AF65-F5344CB8AC3E}">
-        <p14:creationId xmlns:p14="http://schemas.microsoft.com/office/powerpoint/2010/main" val="1659066693"/>
-      </p:ext>
-    </p:extLst>
   </p:cSld>
   <p:clrMapOvr>
     <a:masterClrMapping/>
@@ -1936,7 +1937,7 @@
     </p:spTree>
     <p:extLst>
       <p:ext uri="{BB962C8B-B14F-4D97-AF65-F5344CB8AC3E}">
-        <p14:creationId xmlns:p14="http://schemas.microsoft.com/office/powerpoint/2010/main" val="1577817090"/>
+        <p14:creationId xmlns:p14="http://schemas.microsoft.com/office/powerpoint/2010/main" val="1659066693"/>
       </p:ext>
     </p:extLst>
   </p:cSld>
@@ -2149,6 +2150,115 @@
     </p:spTree>
     <p:extLst>
       <p:ext uri="{BB962C8B-B14F-4D97-AF65-F5344CB8AC3E}">
+        <p14:creationId xmlns:p14="http://schemas.microsoft.com/office/powerpoint/2010/main" val="1577817090"/>
+      </p:ext>
+    </p:extLst>
+  </p:cSld>
+  <p:clrMapOvr>
+    <a:masterClrMapping/>
+  </p:clrMapOvr>
+</p:notes>
+</file>
+
+<file path=ppt/notesSlides/notesSlide21.xml><?xml version="1.0" encoding="utf-8"?>
+<p:notes xmlns:a="http://schemas.openxmlformats.org/drawingml/2006/main" xmlns:r="http://schemas.openxmlformats.org/officeDocument/2006/relationships" xmlns:p="http://schemas.openxmlformats.org/presentationml/2006/main" showMasterSp="0" showMasterPhAnim="0">
+  <p:cSld>
+    <p:spTree>
+      <p:nvGrpSpPr>
+        <p:cNvPr id="1" name="Shape 313"/>
+        <p:cNvGrpSpPr/>
+        <p:nvPr/>
+      </p:nvGrpSpPr>
+      <p:grpSpPr>
+        <a:xfrm>
+          <a:off x="0" y="0"/>
+          <a:ext cx="0" cy="0"/>
+          <a:chOff x="0" y="0"/>
+          <a:chExt cx="0" cy="0"/>
+        </a:xfrm>
+      </p:grpSpPr>
+      <p:sp>
+        <p:nvSpPr>
+          <p:cNvPr id="314" name="Google Shape;314;g18740951071_0_77:notes"/>
+          <p:cNvSpPr>
+            <a:spLocks noGrp="1" noRot="1" noChangeAspect="1"/>
+          </p:cNvSpPr>
+          <p:nvPr>
+            <p:ph type="sldImg" idx="2"/>
+          </p:nvPr>
+        </p:nvSpPr>
+        <p:spPr>
+          <a:xfrm>
+            <a:off x="381000" y="685800"/>
+            <a:ext cx="6096000" cy="3429000"/>
+          </a:xfrm>
+          <a:custGeom>
+            <a:avLst/>
+            <a:gdLst/>
+            <a:ahLst/>
+            <a:cxnLst/>
+            <a:rect l="l" t="t" r="r" b="b"/>
+            <a:pathLst>
+              <a:path w="120000" h="120000" extrusionOk="0">
+                <a:moveTo>
+                  <a:pt x="0" y="0"/>
+                </a:moveTo>
+                <a:lnTo>
+                  <a:pt x="120000" y="0"/>
+                </a:lnTo>
+                <a:lnTo>
+                  <a:pt x="120000" y="120000"/>
+                </a:lnTo>
+                <a:lnTo>
+                  <a:pt x="0" y="120000"/>
+                </a:lnTo>
+                <a:close/>
+              </a:path>
+            </a:pathLst>
+          </a:custGeom>
+        </p:spPr>
+      </p:sp>
+      <p:sp>
+        <p:nvSpPr>
+          <p:cNvPr id="315" name="Google Shape;315;g18740951071_0_77:notes"/>
+          <p:cNvSpPr txBox="1">
+            <a:spLocks noGrp="1"/>
+          </p:cNvSpPr>
+          <p:nvPr>
+            <p:ph type="body" idx="1"/>
+          </p:nvPr>
+        </p:nvSpPr>
+        <p:spPr>
+          <a:xfrm>
+            <a:off x="685800" y="4343400"/>
+            <a:ext cx="5486400" cy="4114800"/>
+          </a:xfrm>
+          <a:prstGeom prst="rect">
+            <a:avLst/>
+          </a:prstGeom>
+        </p:spPr>
+        <p:txBody>
+          <a:bodyPr spcFirstLastPara="1" wrap="square" lIns="91425" tIns="91425" rIns="91425" bIns="91425" anchor="t" anchorCtr="0">
+            <a:noAutofit/>
+          </a:bodyPr>
+          <a:lstStyle/>
+          <a:p>
+            <a:pPr marL="0" lvl="0" indent="0" algn="l" rtl="0">
+              <a:spcBef>
+                <a:spcPts val="0"/>
+              </a:spcBef>
+              <a:spcAft>
+                <a:spcPts val="0"/>
+              </a:spcAft>
+              <a:buNone/>
+            </a:pPr>
+            <a:endParaRPr/>
+          </a:p>
+        </p:txBody>
+      </p:sp>
+    </p:spTree>
+    <p:extLst>
+      <p:ext uri="{BB962C8B-B14F-4D97-AF65-F5344CB8AC3E}">
         <p14:creationId xmlns:p14="http://schemas.microsoft.com/office/powerpoint/2010/main" val="847761554"/>
       </p:ext>
     </p:extLst>
@@ -2159,7 +2269,7 @@
 </p:notes>
 </file>
 
-<file path=ppt/notesSlides/notesSlide21.xml><?xml version="1.0" encoding="utf-8"?>
+<file path=ppt/notesSlides/notesSlide22.xml><?xml version="1.0" encoding="utf-8"?>
 <p:notes xmlns:a="http://schemas.openxmlformats.org/drawingml/2006/main" xmlns:r="http://schemas.openxmlformats.org/officeDocument/2006/relationships" xmlns:p="http://schemas.openxmlformats.org/presentationml/2006/main" showMasterSp="0" showMasterPhAnim="0">
   <p:cSld>
     <p:spTree>
@@ -2263,7 +2373,7 @@
 </p:notes>
 </file>
 
-<file path=ppt/notesSlides/notesSlide22.xml><?xml version="1.0" encoding="utf-8"?>
+<file path=ppt/notesSlides/notesSlide23.xml><?xml version="1.0" encoding="utf-8"?>
 <p:notes xmlns:a="http://schemas.openxmlformats.org/drawingml/2006/main" xmlns:r="http://schemas.openxmlformats.org/officeDocument/2006/relationships" xmlns:p="http://schemas.openxmlformats.org/presentationml/2006/main" showMasterSp="0" showMasterPhAnim="0">
   <p:cSld>
     <p:spTree>
@@ -2367,7 +2477,7 @@
 </p:notes>
 </file>
 
-<file path=ppt/notesSlides/notesSlide23.xml><?xml version="1.0" encoding="utf-8"?>
+<file path=ppt/notesSlides/notesSlide24.xml><?xml version="1.0" encoding="utf-8"?>
 <p:notes xmlns:a="http://schemas.openxmlformats.org/drawingml/2006/main" xmlns:r="http://schemas.openxmlformats.org/officeDocument/2006/relationships" xmlns:p="http://schemas.openxmlformats.org/presentationml/2006/main" showMasterSp="0" showMasterPhAnim="0">
   <p:cSld>
     <p:spTree>
@@ -2471,7 +2581,7 @@
 </p:notes>
 </file>
 
-<file path=ppt/notesSlides/notesSlide24.xml><?xml version="1.0" encoding="utf-8"?>
+<file path=ppt/notesSlides/notesSlide25.xml><?xml version="1.0" encoding="utf-8"?>
 <p:notes xmlns:a="http://schemas.openxmlformats.org/drawingml/2006/main" xmlns:r="http://schemas.openxmlformats.org/officeDocument/2006/relationships" xmlns:p="http://schemas.openxmlformats.org/presentationml/2006/main" showMasterSp="0" showMasterPhAnim="0">
   <p:cSld>
     <p:spTree>
@@ -2575,7 +2685,7 @@
 </p:notes>
 </file>
 
-<file path=ppt/notesSlides/notesSlide25.xml><?xml version="1.0" encoding="utf-8"?>
+<file path=ppt/notesSlides/notesSlide26.xml><?xml version="1.0" encoding="utf-8"?>
 <p:notes xmlns:a="http://schemas.openxmlformats.org/drawingml/2006/main" xmlns:r="http://schemas.openxmlformats.org/officeDocument/2006/relationships" xmlns:p="http://schemas.openxmlformats.org/presentationml/2006/main" showMasterSp="0" showMasterPhAnim="0">
   <p:cSld>
     <p:spTree>
@@ -2679,7 +2789,7 @@
 </p:notes>
 </file>
 
-<file path=ppt/notesSlides/notesSlide26.xml><?xml version="1.0" encoding="utf-8"?>
+<file path=ppt/notesSlides/notesSlide27.xml><?xml version="1.0" encoding="utf-8"?>
 <p:notes xmlns:a="http://schemas.openxmlformats.org/drawingml/2006/main" xmlns:r="http://schemas.openxmlformats.org/officeDocument/2006/relationships" xmlns:p="http://schemas.openxmlformats.org/presentationml/2006/main" showMasterSp="0" showMasterPhAnim="0">
   <p:cSld>
     <p:spTree>
@@ -2783,7 +2893,7 @@
 </p:notes>
 </file>
 
-<file path=ppt/notesSlides/notesSlide27.xml><?xml version="1.0" encoding="utf-8"?>
+<file path=ppt/notesSlides/notesSlide28.xml><?xml version="1.0" encoding="utf-8"?>
 <p:notes xmlns:a="http://schemas.openxmlformats.org/drawingml/2006/main" xmlns:r="http://schemas.openxmlformats.org/officeDocument/2006/relationships" xmlns:p="http://schemas.openxmlformats.org/presentationml/2006/main" showMasterSp="0" showMasterPhAnim="0">
   <p:cSld>
     <p:spTree>
@@ -2887,7 +2997,7 @@
 </p:notes>
 </file>
 
-<file path=ppt/notesSlides/notesSlide28.xml><?xml version="1.0" encoding="utf-8"?>
+<file path=ppt/notesSlides/notesSlide29.xml><?xml version="1.0" encoding="utf-8"?>
 <p:notes xmlns:a="http://schemas.openxmlformats.org/drawingml/2006/main" xmlns:r="http://schemas.openxmlformats.org/officeDocument/2006/relationships" xmlns:p="http://schemas.openxmlformats.org/presentationml/2006/main" showMasterSp="0" showMasterPhAnim="0">
   <p:cSld>
     <p:spTree>
@@ -2948,110 +3058,6 @@
       <p:sp>
         <p:nvSpPr>
           <p:cNvPr id="458" name="Google Shape;458;gdf6222e6af_0_64:notes"/>
-          <p:cNvSpPr txBox="1">
-            <a:spLocks noGrp="1"/>
-          </p:cNvSpPr>
-          <p:nvPr>
-            <p:ph type="body" idx="1"/>
-          </p:nvPr>
-        </p:nvSpPr>
-        <p:spPr>
-          <a:xfrm>
-            <a:off x="685800" y="4343400"/>
-            <a:ext cx="5486400" cy="4114800"/>
-          </a:xfrm>
-          <a:prstGeom prst="rect">
-            <a:avLst/>
-          </a:prstGeom>
-        </p:spPr>
-        <p:txBody>
-          <a:bodyPr spcFirstLastPara="1" wrap="square" lIns="91425" tIns="91425" rIns="91425" bIns="91425" anchor="t" anchorCtr="0">
-            <a:noAutofit/>
-          </a:bodyPr>
-          <a:lstStyle/>
-          <a:p>
-            <a:pPr marL="0" lvl="0" indent="0" algn="l" rtl="0">
-              <a:spcBef>
-                <a:spcPts val="0"/>
-              </a:spcBef>
-              <a:spcAft>
-                <a:spcPts val="0"/>
-              </a:spcAft>
-              <a:buNone/>
-            </a:pPr>
-            <a:endParaRPr/>
-          </a:p>
-        </p:txBody>
-      </p:sp>
-    </p:spTree>
-  </p:cSld>
-  <p:clrMapOvr>
-    <a:masterClrMapping/>
-  </p:clrMapOvr>
-</p:notes>
-</file>
-
-<file path=ppt/notesSlides/notesSlide29.xml><?xml version="1.0" encoding="utf-8"?>
-<p:notes xmlns:a="http://schemas.openxmlformats.org/drawingml/2006/main" xmlns:r="http://schemas.openxmlformats.org/officeDocument/2006/relationships" xmlns:p="http://schemas.openxmlformats.org/presentationml/2006/main" showMasterSp="0" showMasterPhAnim="0">
-  <p:cSld>
-    <p:spTree>
-      <p:nvGrpSpPr>
-        <p:cNvPr id="1" name="Shape 471"/>
-        <p:cNvGrpSpPr/>
-        <p:nvPr/>
-      </p:nvGrpSpPr>
-      <p:grpSpPr>
-        <a:xfrm>
-          <a:off x="0" y="0"/>
-          <a:ext cx="0" cy="0"/>
-          <a:chOff x="0" y="0"/>
-          <a:chExt cx="0" cy="0"/>
-        </a:xfrm>
-      </p:grpSpPr>
-      <p:sp>
-        <p:nvSpPr>
-          <p:cNvPr id="472" name="Google Shape;472;ge04b8b6756_0_36:notes"/>
-          <p:cNvSpPr>
-            <a:spLocks noGrp="1" noRot="1" noChangeAspect="1"/>
-          </p:cNvSpPr>
-          <p:nvPr>
-            <p:ph type="sldImg" idx="2"/>
-          </p:nvPr>
-        </p:nvSpPr>
-        <p:spPr>
-          <a:xfrm>
-            <a:off x="381000" y="685800"/>
-            <a:ext cx="6096000" cy="3429000"/>
-          </a:xfrm>
-          <a:custGeom>
-            <a:avLst/>
-            <a:gdLst/>
-            <a:ahLst/>
-            <a:cxnLst/>
-            <a:rect l="l" t="t" r="r" b="b"/>
-            <a:pathLst>
-              <a:path w="120000" h="120000" extrusionOk="0">
-                <a:moveTo>
-                  <a:pt x="0" y="0"/>
-                </a:moveTo>
-                <a:lnTo>
-                  <a:pt x="120000" y="0"/>
-                </a:lnTo>
-                <a:lnTo>
-                  <a:pt x="120000" y="120000"/>
-                </a:lnTo>
-                <a:lnTo>
-                  <a:pt x="0" y="120000"/>
-                </a:lnTo>
-                <a:close/>
-              </a:path>
-            </a:pathLst>
-          </a:custGeom>
-        </p:spPr>
-      </p:sp>
-      <p:sp>
-        <p:nvSpPr>
-          <p:cNvPr id="473" name="Google Shape;473;ge04b8b6756_0_36:notes"/>
           <p:cNvSpPr txBox="1">
             <a:spLocks noGrp="1"/>
           </p:cNvSpPr>
@@ -3200,6 +3206,110 @@
 </file>
 
 <file path=ppt/notesSlides/notesSlide30.xml><?xml version="1.0" encoding="utf-8"?>
+<p:notes xmlns:a="http://schemas.openxmlformats.org/drawingml/2006/main" xmlns:r="http://schemas.openxmlformats.org/officeDocument/2006/relationships" xmlns:p="http://schemas.openxmlformats.org/presentationml/2006/main" showMasterSp="0" showMasterPhAnim="0">
+  <p:cSld>
+    <p:spTree>
+      <p:nvGrpSpPr>
+        <p:cNvPr id="1" name="Shape 471"/>
+        <p:cNvGrpSpPr/>
+        <p:nvPr/>
+      </p:nvGrpSpPr>
+      <p:grpSpPr>
+        <a:xfrm>
+          <a:off x="0" y="0"/>
+          <a:ext cx="0" cy="0"/>
+          <a:chOff x="0" y="0"/>
+          <a:chExt cx="0" cy="0"/>
+        </a:xfrm>
+      </p:grpSpPr>
+      <p:sp>
+        <p:nvSpPr>
+          <p:cNvPr id="472" name="Google Shape;472;ge04b8b6756_0_36:notes"/>
+          <p:cNvSpPr>
+            <a:spLocks noGrp="1" noRot="1" noChangeAspect="1"/>
+          </p:cNvSpPr>
+          <p:nvPr>
+            <p:ph type="sldImg" idx="2"/>
+          </p:nvPr>
+        </p:nvSpPr>
+        <p:spPr>
+          <a:xfrm>
+            <a:off x="381000" y="685800"/>
+            <a:ext cx="6096000" cy="3429000"/>
+          </a:xfrm>
+          <a:custGeom>
+            <a:avLst/>
+            <a:gdLst/>
+            <a:ahLst/>
+            <a:cxnLst/>
+            <a:rect l="l" t="t" r="r" b="b"/>
+            <a:pathLst>
+              <a:path w="120000" h="120000" extrusionOk="0">
+                <a:moveTo>
+                  <a:pt x="0" y="0"/>
+                </a:moveTo>
+                <a:lnTo>
+                  <a:pt x="120000" y="0"/>
+                </a:lnTo>
+                <a:lnTo>
+                  <a:pt x="120000" y="120000"/>
+                </a:lnTo>
+                <a:lnTo>
+                  <a:pt x="0" y="120000"/>
+                </a:lnTo>
+                <a:close/>
+              </a:path>
+            </a:pathLst>
+          </a:custGeom>
+        </p:spPr>
+      </p:sp>
+      <p:sp>
+        <p:nvSpPr>
+          <p:cNvPr id="473" name="Google Shape;473;ge04b8b6756_0_36:notes"/>
+          <p:cNvSpPr txBox="1">
+            <a:spLocks noGrp="1"/>
+          </p:cNvSpPr>
+          <p:nvPr>
+            <p:ph type="body" idx="1"/>
+          </p:nvPr>
+        </p:nvSpPr>
+        <p:spPr>
+          <a:xfrm>
+            <a:off x="685800" y="4343400"/>
+            <a:ext cx="5486400" cy="4114800"/>
+          </a:xfrm>
+          <a:prstGeom prst="rect">
+            <a:avLst/>
+          </a:prstGeom>
+        </p:spPr>
+        <p:txBody>
+          <a:bodyPr spcFirstLastPara="1" wrap="square" lIns="91425" tIns="91425" rIns="91425" bIns="91425" anchor="t" anchorCtr="0">
+            <a:noAutofit/>
+          </a:bodyPr>
+          <a:lstStyle/>
+          <a:p>
+            <a:pPr marL="0" lvl="0" indent="0" algn="l" rtl="0">
+              <a:spcBef>
+                <a:spcPts val="0"/>
+              </a:spcBef>
+              <a:spcAft>
+                <a:spcPts val="0"/>
+              </a:spcAft>
+              <a:buNone/>
+            </a:pPr>
+            <a:endParaRPr/>
+          </a:p>
+        </p:txBody>
+      </p:sp>
+    </p:spTree>
+  </p:cSld>
+  <p:clrMapOvr>
+    <a:masterClrMapping/>
+  </p:clrMapOvr>
+</p:notes>
+</file>
+
+<file path=ppt/notesSlides/notesSlide31.xml><?xml version="1.0" encoding="utf-8"?>
 <p:notes xmlns:a="http://schemas.openxmlformats.org/drawingml/2006/main" xmlns:r="http://schemas.openxmlformats.org/officeDocument/2006/relationships" xmlns:p="http://schemas.openxmlformats.org/presentationml/2006/main" showMasterSp="0" showMasterPhAnim="0">
   <p:cSld>
     <p:spTree>
@@ -30137,6 +30247,504 @@
           </a:p>
         </p:txBody>
       </p:sp>
+      <mc:AlternateContent xmlns:mc="http://schemas.openxmlformats.org/markup-compatibility/2006">
+        <mc:Choice xmlns:a14="http://schemas.microsoft.com/office/drawing/2010/main" Requires="a14">
+          <p:sp>
+            <p:nvSpPr>
+              <p:cNvPr id="311" name="Google Shape;311;p57"/>
+              <p:cNvSpPr txBox="1">
+                <a:spLocks noGrp="1"/>
+              </p:cNvSpPr>
+              <p:nvPr>
+                <p:ph type="body" idx="1"/>
+              </p:nvPr>
+            </p:nvSpPr>
+            <p:spPr>
+              <a:xfrm>
+                <a:off x="500550" y="935201"/>
+                <a:ext cx="8205300" cy="3543299"/>
+              </a:xfrm>
+              <a:prstGeom prst="rect">
+                <a:avLst/>
+              </a:prstGeom>
+            </p:spPr>
+            <p:txBody>
+              <a:bodyPr spcFirstLastPara="1" wrap="square" lIns="91425" tIns="91425" rIns="91425" bIns="91425" anchor="t" anchorCtr="0">
+                <a:normAutofit fontScale="92500" lnSpcReduction="10000"/>
+              </a:bodyPr>
+              <a:lstStyle/>
+              <a:p>
+                <a:pPr marL="0" lvl="0" indent="0">
+                  <a:lnSpc>
+                    <a:spcPct val="115000"/>
+                  </a:lnSpc>
+                  <a:buNone/>
+                </a:pPr>
+                <a:r>
+                  <a:rPr lang="ru-RU" dirty="0"/>
+                  <a:t>Бросаем монетку </a:t>
+                </a:r>
+                <a:r>
+                  <a:rPr lang="en-US" i="1" dirty="0"/>
+                  <a:t>n</a:t>
+                </a:r>
+                <a:r>
+                  <a:rPr lang="en-US" dirty="0"/>
+                  <a:t> </a:t>
+                </a:r>
+                <a:r>
+                  <a:rPr lang="ru-RU" dirty="0"/>
+                  <a:t>раз, </a:t>
+                </a:r>
+                <a:r>
+                  <a:rPr lang="en-US" i="1" dirty="0"/>
+                  <a:t>k</a:t>
+                </a:r>
+                <a:r>
+                  <a:rPr lang="en-US" dirty="0"/>
+                  <a:t> </a:t>
+                </a:r>
+                <a:r>
+                  <a:rPr lang="ru-RU" dirty="0"/>
+                  <a:t>раз выпал орел. Определить является ли наша монетка честной или нет. Монетка не честная, если вероятность выпадения орла существенно отличается от 1/2.</a:t>
+                </a:r>
+              </a:p>
+              <a:p>
+                <a:pPr marL="0" lvl="0" indent="0">
+                  <a:lnSpc>
+                    <a:spcPct val="115000"/>
+                  </a:lnSpc>
+                  <a:buNone/>
+                </a:pPr>
+                <a:endParaRPr lang="ru-RU" dirty="0"/>
+              </a:p>
+              <a:p>
+                <a:pPr marL="0" lvl="0" indent="0">
+                  <a:lnSpc>
+                    <a:spcPct val="115000"/>
+                  </a:lnSpc>
+                  <a:buNone/>
+                </a:pPr>
+                <a:r>
+                  <a:rPr lang="ru-RU" b="1" dirty="0"/>
+                  <a:t>Решение</a:t>
+                </a:r>
+                <a:r>
+                  <a:rPr lang="en-US" b="1" dirty="0"/>
+                  <a:t> </a:t>
+                </a:r>
+                <a:r>
+                  <a:rPr lang="en-US" dirty="0"/>
+                  <a:t>(</a:t>
+                </a:r>
+                <a:r>
+                  <a:rPr lang="ru-RU" dirty="0"/>
+                  <a:t>метод максимального правдоподобия)</a:t>
+                </a:r>
+                <a:r>
+                  <a:rPr lang="ru-RU" b="1" dirty="0"/>
+                  <a:t>:</a:t>
+                </a:r>
+              </a:p>
+              <a:p>
+                <a:pPr marL="342900" lvl="0" indent="-342900">
+                  <a:lnSpc>
+                    <a:spcPct val="115000"/>
+                  </a:lnSpc>
+                  <a:buAutoNum type="arabicPeriod"/>
+                </a:pPr>
+                <a:r>
+                  <a:rPr lang="ru-RU" dirty="0"/>
+                  <a:t>Предлагаемое распределение монетки – распределение Бернулли с параметром </a:t>
+                </a:r>
+                <a:r>
+                  <a:rPr lang="en-US" i="1" dirty="0"/>
+                  <a:t>p</a:t>
+                </a:r>
+                <a:r>
+                  <a:rPr lang="en-US" dirty="0"/>
+                  <a:t>.</a:t>
+                </a:r>
+              </a:p>
+              <a:p>
+                <a:pPr marL="342900" lvl="0" indent="-342900">
+                  <a:lnSpc>
+                    <a:spcPct val="115000"/>
+                  </a:lnSpc>
+                  <a:buAutoNum type="arabicPeriod"/>
+                </a:pPr>
+                <a:r>
+                  <a:rPr lang="ru-RU" dirty="0"/>
+                  <a:t>Вероятность выпасть </a:t>
+                </a:r>
+                <a:r>
+                  <a:rPr lang="en-US" i="1" dirty="0"/>
+                  <a:t>k</a:t>
+                </a:r>
+                <a:r>
+                  <a:rPr lang="en-US" dirty="0"/>
+                  <a:t> </a:t>
+                </a:r>
+                <a:r>
+                  <a:rPr lang="ru-RU" dirty="0"/>
+                  <a:t>орлов – биномиальное распределение </a:t>
+                </a:r>
+                <a14:m>
+                  <m:oMath xmlns:m="http://schemas.openxmlformats.org/officeDocument/2006/math">
+                    <m:d>
+                      <m:dPr>
+                        <m:ctrlPr>
+                          <a:rPr lang="ru-RU" i="1" smtClean="0">
+                            <a:latin typeface="Cambria Math" panose="02040503050406030204" pitchFamily="18" charset="0"/>
+                          </a:rPr>
+                        </m:ctrlPr>
+                      </m:dPr>
+                      <m:e>
+                        <m:m>
+                          <m:mPr>
+                            <m:mcs>
+                              <m:mc>
+                                <m:mcPr>
+                                  <m:count m:val="1"/>
+                                  <m:mcJc m:val="center"/>
+                                </m:mcPr>
+                              </m:mc>
+                            </m:mcs>
+                            <m:ctrlPr>
+                              <a:rPr lang="ru-RU" i="1" smtClean="0">
+                                <a:latin typeface="Cambria Math" panose="02040503050406030204" pitchFamily="18" charset="0"/>
+                              </a:rPr>
+                            </m:ctrlPr>
+                          </m:mPr>
+                          <m:mr>
+                            <m:e>
+                              <m:r>
+                                <m:rPr>
+                                  <m:brk m:alnAt="7"/>
+                                </m:rPr>
+                                <a:rPr lang="en-US" b="0" i="1" smtClean="0">
+                                  <a:latin typeface="Cambria Math" panose="02040503050406030204" pitchFamily="18" charset="0"/>
+                                </a:rPr>
+                                <m:t>𝑛</m:t>
+                              </m:r>
+                            </m:e>
+                          </m:mr>
+                          <m:mr>
+                            <m:e>
+                              <m:r>
+                                <a:rPr lang="en-US" b="0" i="1" smtClean="0">
+                                  <a:latin typeface="Cambria Math" panose="02040503050406030204" pitchFamily="18" charset="0"/>
+                                </a:rPr>
+                                <m:t>𝑘</m:t>
+                              </m:r>
+                            </m:e>
+                          </m:mr>
+                        </m:m>
+                      </m:e>
+                    </m:d>
+                    <m:sSup>
+                      <m:sSupPr>
+                        <m:ctrlPr>
+                          <a:rPr lang="ru-RU" i="1" smtClean="0">
+                            <a:latin typeface="Cambria Math" panose="02040503050406030204" pitchFamily="18" charset="0"/>
+                          </a:rPr>
+                        </m:ctrlPr>
+                      </m:sSupPr>
+                      <m:e>
+                        <m:r>
+                          <a:rPr lang="en-US" b="0" i="1" smtClean="0">
+                            <a:latin typeface="Cambria Math" panose="02040503050406030204" pitchFamily="18" charset="0"/>
+                          </a:rPr>
+                          <m:t>𝑝</m:t>
+                        </m:r>
+                      </m:e>
+                      <m:sup>
+                        <m:r>
+                          <a:rPr lang="en-US" b="0" i="1" smtClean="0">
+                            <a:latin typeface="Cambria Math" panose="02040503050406030204" pitchFamily="18" charset="0"/>
+                          </a:rPr>
+                          <m:t>𝑘</m:t>
+                        </m:r>
+                      </m:sup>
+                    </m:sSup>
+                    <m:sSup>
+                      <m:sSupPr>
+                        <m:ctrlPr>
+                          <a:rPr lang="ru-RU" i="1" smtClean="0">
+                            <a:latin typeface="Cambria Math" panose="02040503050406030204" pitchFamily="18" charset="0"/>
+                          </a:rPr>
+                        </m:ctrlPr>
+                      </m:sSupPr>
+                      <m:e>
+                        <m:r>
+                          <a:rPr lang="en-US" b="0" i="1" smtClean="0">
+                            <a:latin typeface="Cambria Math" panose="02040503050406030204" pitchFamily="18" charset="0"/>
+                          </a:rPr>
+                          <m:t>𝑞</m:t>
+                        </m:r>
+                      </m:e>
+                      <m:sup>
+                        <m:r>
+                          <a:rPr lang="en-US" b="0" i="1" smtClean="0">
+                            <a:latin typeface="Cambria Math" panose="02040503050406030204" pitchFamily="18" charset="0"/>
+                          </a:rPr>
+                          <m:t>𝑛</m:t>
+                        </m:r>
+                        <m:r>
+                          <a:rPr lang="en-US" b="0" i="1" smtClean="0">
+                            <a:latin typeface="Cambria Math" panose="02040503050406030204" pitchFamily="18" charset="0"/>
+                          </a:rPr>
+                          <m:t>−</m:t>
+                        </m:r>
+                        <m:r>
+                          <a:rPr lang="en-US" b="0" i="1" smtClean="0">
+                            <a:latin typeface="Cambria Math" panose="02040503050406030204" pitchFamily="18" charset="0"/>
+                          </a:rPr>
+                          <m:t>𝑘</m:t>
+                        </m:r>
+                      </m:sup>
+                    </m:sSup>
+                  </m:oMath>
+                </a14:m>
+                <a:endParaRPr lang="en-US" dirty="0"/>
+              </a:p>
+              <a:p>
+                <a:pPr marL="342900" lvl="0" indent="-342900">
+                  <a:lnSpc>
+                    <a:spcPct val="115000"/>
+                  </a:lnSpc>
+                  <a:buAutoNum type="arabicPeriod"/>
+                </a:pPr>
+                <a:r>
+                  <a:rPr lang="ru-RU" dirty="0"/>
+                  <a:t>Найдем такое значение параметра </a:t>
+                </a:r>
+                <a:r>
+                  <a:rPr lang="en-US" i="1" dirty="0"/>
+                  <a:t>p</a:t>
+                </a:r>
+                <a:r>
+                  <a:rPr lang="en-US" dirty="0"/>
+                  <a:t> </a:t>
+                </a:r>
+                <a:r>
+                  <a:rPr lang="ru-RU" dirty="0"/>
+                  <a:t>при котором вероятность пронаблюдать наши данные (</a:t>
+                </a:r>
+                <a:r>
+                  <a:rPr lang="en-US" i="1" dirty="0"/>
+                  <a:t>k</a:t>
+                </a:r>
+                <a:r>
+                  <a:rPr lang="en-US" dirty="0"/>
+                  <a:t> </a:t>
+                </a:r>
+                <a:r>
+                  <a:rPr lang="ru-RU" dirty="0"/>
+                  <a:t>орлов) максимальна</a:t>
+                </a:r>
+              </a:p>
+              <a:p>
+                <a:pPr marL="342900" lvl="0" indent="-342900">
+                  <a:lnSpc>
+                    <a:spcPct val="115000"/>
+                  </a:lnSpc>
+                  <a:buAutoNum type="arabicPeriod"/>
+                </a:pPr>
+                <a:r>
+                  <a:rPr lang="ru-RU" dirty="0"/>
+                  <a:t>Для оценки вероятности поделим число исходов на число попыток </a:t>
+                </a:r>
+                <a14:m>
+                  <m:oMath xmlns:m="http://schemas.openxmlformats.org/officeDocument/2006/math">
+                    <m:f>
+                      <m:fPr>
+                        <m:type m:val="skw"/>
+                        <m:ctrlPr>
+                          <a:rPr lang="ru-RU" i="1" smtClean="0">
+                            <a:latin typeface="Cambria Math" panose="02040503050406030204" pitchFamily="18" charset="0"/>
+                          </a:rPr>
+                        </m:ctrlPr>
+                      </m:fPr>
+                      <m:num>
+                        <m:r>
+                          <a:rPr lang="en-US" b="0" i="1" smtClean="0">
+                            <a:latin typeface="Cambria Math" panose="02040503050406030204" pitchFamily="18" charset="0"/>
+                          </a:rPr>
+                          <m:t>𝑘</m:t>
+                        </m:r>
+                      </m:num>
+                      <m:den>
+                        <m:r>
+                          <a:rPr lang="en-US" b="0" i="1" smtClean="0">
+                            <a:latin typeface="Cambria Math" panose="02040503050406030204" pitchFamily="18" charset="0"/>
+                          </a:rPr>
+                          <m:t>𝑛</m:t>
+                        </m:r>
+                      </m:den>
+                    </m:f>
+                  </m:oMath>
+                </a14:m>
+                <a:endParaRPr lang="en-US" dirty="0"/>
+              </a:p>
+              <a:p>
+                <a:pPr marL="342900" lvl="0" indent="-342900">
+                  <a:lnSpc>
+                    <a:spcPct val="115000"/>
+                  </a:lnSpc>
+                  <a:buAutoNum type="arabicPeriod"/>
+                </a:pPr>
+                <a:r>
+                  <a:rPr lang="ru-RU" dirty="0"/>
+                  <a:t>Применим статистический тест чтобы сравнить гипотезы</a:t>
+                </a:r>
+              </a:p>
+              <a:p>
+                <a:pPr marL="342900" lvl="0" indent="-342900">
+                  <a:lnSpc>
+                    <a:spcPct val="115000"/>
+                  </a:lnSpc>
+                  <a:buAutoNum type="arabicPeriod"/>
+                </a:pPr>
+                <a:endParaRPr lang="ru-RU" dirty="0"/>
+              </a:p>
+              <a:p>
+                <a:pPr marL="0" lvl="0" indent="0">
+                  <a:lnSpc>
+                    <a:spcPct val="115000"/>
+                  </a:lnSpc>
+                  <a:buNone/>
+                </a:pPr>
+                <a:r>
+                  <a:rPr lang="ru-RU" b="1" dirty="0"/>
+                  <a:t>А если мы сделали 3 броска и все 3 орла? Монетка не честная? А точно? А на сколько точно?</a:t>
+                </a:r>
+              </a:p>
+              <a:p>
+                <a:pPr marL="342900" lvl="0" indent="-342900">
+                  <a:lnSpc>
+                    <a:spcPct val="115000"/>
+                  </a:lnSpc>
+                  <a:buAutoNum type="arabicPeriod"/>
+                </a:pPr>
+                <a:endParaRPr dirty="0"/>
+              </a:p>
+            </p:txBody>
+          </p:sp>
+        </mc:Choice>
+        <mc:Fallback>
+          <p:sp>
+            <p:nvSpPr>
+              <p:cNvPr id="311" name="Google Shape;311;p57"/>
+              <p:cNvSpPr txBox="1">
+                <a:spLocks noGrp="1" noRot="1" noChangeAspect="1" noMove="1" noResize="1" noEditPoints="1" noAdjustHandles="1" noChangeArrowheads="1" noChangeShapeType="1" noTextEdit="1"/>
+              </p:cNvSpPr>
+              <p:nvPr>
+                <p:ph type="body" idx="1"/>
+              </p:nvPr>
+            </p:nvSpPr>
+            <p:spPr>
+              <a:xfrm>
+                <a:off x="500550" y="935201"/>
+                <a:ext cx="8205300" cy="3543299"/>
+              </a:xfrm>
+              <a:prstGeom prst="rect">
+                <a:avLst/>
+              </a:prstGeom>
+              <a:blipFill>
+                <a:blip r:embed="rId3"/>
+                <a:stretch>
+                  <a:fillRect l="-309"/>
+                </a:stretch>
+              </a:blipFill>
+            </p:spPr>
+            <p:txBody>
+              <a:bodyPr/>
+              <a:lstStyle/>
+              <a:p>
+                <a:r>
+                  <a:rPr lang="en-RU">
+                    <a:noFill/>
+                  </a:rPr>
+                  <a:t> </a:t>
+                </a:r>
+              </a:p>
+            </p:txBody>
+          </p:sp>
+        </mc:Fallback>
+      </mc:AlternateContent>
+    </p:spTree>
+    <p:extLst>
+      <p:ext uri="{BB962C8B-B14F-4D97-AF65-F5344CB8AC3E}">
+        <p14:creationId xmlns:p14="http://schemas.microsoft.com/office/powerpoint/2010/main" val="1481076973"/>
+      </p:ext>
+    </p:extLst>
+  </p:cSld>
+  <p:clrMapOvr>
+    <a:masterClrMapping/>
+  </p:clrMapOvr>
+</p:sld>
+</file>
+
+<file path=ppt/slides/slide22.xml><?xml version="1.0" encoding="utf-8"?>
+<p:sld xmlns:a="http://schemas.openxmlformats.org/drawingml/2006/main" xmlns:r="http://schemas.openxmlformats.org/officeDocument/2006/relationships" xmlns:p="http://schemas.openxmlformats.org/presentationml/2006/main">
+  <p:cSld>
+    <p:spTree>
+      <p:nvGrpSpPr>
+        <p:cNvPr id="1" name="Shape 309"/>
+        <p:cNvGrpSpPr/>
+        <p:nvPr/>
+      </p:nvGrpSpPr>
+      <p:grpSpPr>
+        <a:xfrm>
+          <a:off x="0" y="0"/>
+          <a:ext cx="0" cy="0"/>
+          <a:chOff x="0" y="0"/>
+          <a:chExt cx="0" cy="0"/>
+        </a:xfrm>
+      </p:grpSpPr>
+      <p:sp>
+        <p:nvSpPr>
+          <p:cNvPr id="310" name="Google Shape;310;p57"/>
+          <p:cNvSpPr txBox="1">
+            <a:spLocks noGrp="1"/>
+          </p:cNvSpPr>
+          <p:nvPr>
+            <p:ph type="title"/>
+          </p:nvPr>
+        </p:nvSpPr>
+        <p:spPr>
+          <a:xfrm>
+            <a:off x="500550" y="330724"/>
+            <a:ext cx="8520600" cy="1095900"/>
+          </a:xfrm>
+          <a:prstGeom prst="rect">
+            <a:avLst/>
+          </a:prstGeom>
+        </p:spPr>
+        <p:txBody>
+          <a:bodyPr spcFirstLastPara="1" wrap="square" lIns="91425" tIns="91425" rIns="91425" bIns="91425" anchor="t" anchorCtr="0">
+            <a:noAutofit/>
+          </a:bodyPr>
+          <a:lstStyle/>
+          <a:p>
+            <a:pPr marL="0" lvl="0" indent="0" algn="l" rtl="0">
+              <a:spcBef>
+                <a:spcPts val="0"/>
+              </a:spcBef>
+              <a:spcAft>
+                <a:spcPts val="0"/>
+              </a:spcAft>
+              <a:buNone/>
+            </a:pPr>
+            <a:r>
+              <a:rPr lang="ru" dirty="0"/>
+              <a:t>Статистический вывод</a:t>
+            </a:r>
+            <a:endParaRPr dirty="0"/>
+          </a:p>
+        </p:txBody>
+      </p:sp>
       <mc:AlternateContent xmlns:mc="http://schemas.openxmlformats.org/markup-compatibility/2006" xmlns:a14="http://schemas.microsoft.com/office/drawing/2010/main">
         <mc:Choice Requires="a14">
           <p:sp>
@@ -31311,7 +31919,7 @@
 </p:sld>
 </file>
 
-<file path=ppt/slides/slide22.xml><?xml version="1.0" encoding="utf-8"?>
+<file path=ppt/slides/slide23.xml><?xml version="1.0" encoding="utf-8"?>
 <p:sld xmlns:a="http://schemas.openxmlformats.org/drawingml/2006/main" xmlns:r="http://schemas.openxmlformats.org/officeDocument/2006/relationships" xmlns:p="http://schemas.openxmlformats.org/presentationml/2006/main">
   <p:cSld>
     <p:spTree>
@@ -31812,7 +32420,7 @@
 </p:sld>
 </file>
 
-<file path=ppt/slides/slide23.xml><?xml version="1.0" encoding="utf-8"?>
+<file path=ppt/slides/slide24.xml><?xml version="1.0" encoding="utf-8"?>
 <p:sld xmlns:a="http://schemas.openxmlformats.org/drawingml/2006/main" xmlns:r="http://schemas.openxmlformats.org/officeDocument/2006/relationships" xmlns:p="http://schemas.openxmlformats.org/presentationml/2006/main">
   <p:cSld>
     <p:spTree>
@@ -32125,7 +32733,7 @@
               <a:rPr lang="ru-RU" sz="1600" dirty="0">
                 <a:latin typeface="Roboto" panose="02000000000000000000" pitchFamily="2" charset="0"/>
               </a:rPr>
-              <a:t>это жуткие костыли. </a:t>
+              <a:t>это костыли. </a:t>
             </a:r>
           </a:p>
           <a:p>
@@ -32253,7 +32861,7 @@
 </p:sld>
 </file>
 
-<file path=ppt/slides/slide24.xml><?xml version="1.0" encoding="utf-8"?>
+<file path=ppt/slides/slide25.xml><?xml version="1.0" encoding="utf-8"?>
 <p:sld xmlns:a="http://schemas.openxmlformats.org/drawingml/2006/main" xmlns:r="http://schemas.openxmlformats.org/officeDocument/2006/relationships" xmlns:p="http://schemas.openxmlformats.org/presentationml/2006/main">
   <p:cSld>
     <p:spTree>
@@ -32812,7 +33420,7 @@
 </p:sld>
 </file>
 
-<file path=ppt/slides/slide25.xml><?xml version="1.0" encoding="utf-8"?>
+<file path=ppt/slides/slide26.xml><?xml version="1.0" encoding="utf-8"?>
 <p:sld xmlns:a="http://schemas.openxmlformats.org/drawingml/2006/main" xmlns:r="http://schemas.openxmlformats.org/officeDocument/2006/relationships" xmlns:p="http://schemas.openxmlformats.org/presentationml/2006/main">
   <p:cSld>
     <p:spTree>
@@ -33883,7 +34491,7 @@
 </p:sld>
 </file>
 
-<file path=ppt/slides/slide26.xml><?xml version="1.0" encoding="utf-8"?>
+<file path=ppt/slides/slide27.xml><?xml version="1.0" encoding="utf-8"?>
 <p:sld xmlns:a="http://schemas.openxmlformats.org/drawingml/2006/main" xmlns:r="http://schemas.openxmlformats.org/officeDocument/2006/relationships" xmlns:p="http://schemas.openxmlformats.org/presentationml/2006/main">
   <p:cSld>
     <p:spTree>
@@ -33942,8 +34550,8 @@
           </a:p>
         </p:txBody>
       </p:sp>
-      <mc:AlternateContent xmlns:mc="http://schemas.openxmlformats.org/markup-compatibility/2006" xmlns:a14="http://schemas.microsoft.com/office/drawing/2010/main">
-        <mc:Choice Requires="a14">
+      <mc:AlternateContent xmlns:mc="http://schemas.openxmlformats.org/markup-compatibility/2006">
+        <mc:Choice xmlns:a14="http://schemas.microsoft.com/office/drawing/2010/main" Requires="a14">
           <p:sp>
             <p:nvSpPr>
               <p:cNvPr id="3" name="Text Placeholder 2">
@@ -34599,18 +35207,11 @@
                   <a:buChar char="•"/>
                 </a:pPr>
                 <a:r>
-                  <a:rPr lang="ru-RU" sz="1800" dirty="0" err="1">
-                    <a:effectLst/>
-                    <a:latin typeface="Roboto" panose="02000000000000000000" pitchFamily="2" charset="0"/>
-                  </a:rPr>
-                  <a:t>Приорное</a:t>
-                </a:r>
-                <a:r>
                   <a:rPr lang="ru-RU" sz="1800" dirty="0">
                     <a:effectLst/>
                     <a:latin typeface="Roboto" panose="02000000000000000000" pitchFamily="2" charset="0"/>
                   </a:rPr>
-                  <a:t> распределение </a:t>
+                  <a:t>Априорное распределение </a:t>
                 </a:r>
                 <a14:m>
                   <m:oMath xmlns:m="http://schemas.openxmlformats.org/officeDocument/2006/math">
@@ -34976,7 +35577,7 @@
             </p:txBody>
           </p:sp>
         </mc:Choice>
-        <mc:Fallback xmlns="">
+        <mc:Fallback>
           <p:sp>
             <p:nvSpPr>
               <p:cNvPr id="3" name="Text Placeholder 2">
@@ -35033,7 +35634,7 @@
 </p:sld>
 </file>
 
-<file path=ppt/slides/slide27.xml><?xml version="1.0" encoding="utf-8"?>
+<file path=ppt/slides/slide28.xml><?xml version="1.0" encoding="utf-8"?>
 <p:sld xmlns:a="http://schemas.openxmlformats.org/drawingml/2006/main" xmlns:r="http://schemas.openxmlformats.org/officeDocument/2006/relationships" xmlns:p="http://schemas.openxmlformats.org/presentationml/2006/main">
   <p:cSld>
     <p:spTree>
@@ -35172,7 +35773,7 @@
 </p:sld>
 </file>
 
-<file path=ppt/slides/slide28.xml><?xml version="1.0" encoding="utf-8"?>
+<file path=ppt/slides/slide29.xml><?xml version="1.0" encoding="utf-8"?>
 <p:sld xmlns:a="http://schemas.openxmlformats.org/drawingml/2006/main" xmlns:r="http://schemas.openxmlformats.org/officeDocument/2006/relationships" xmlns:p="http://schemas.openxmlformats.org/presentationml/2006/main">
   <p:cSld>
     <p:spTree>
@@ -36284,7 +36885,554 @@
 </p:sld>
 </file>
 
-<file path=ppt/slides/slide29.xml><?xml version="1.0" encoding="utf-8"?>
+<file path=ppt/slides/slide3.xml><?xml version="1.0" encoding="utf-8"?>
+<p:sld xmlns:a="http://schemas.openxmlformats.org/drawingml/2006/main" xmlns:r="http://schemas.openxmlformats.org/officeDocument/2006/relationships" xmlns:p="http://schemas.openxmlformats.org/presentationml/2006/main">
+  <p:cSld>
+    <p:spTree>
+      <p:nvGrpSpPr>
+        <p:cNvPr id="1" name="Shape 203"/>
+        <p:cNvGrpSpPr/>
+        <p:nvPr/>
+      </p:nvGrpSpPr>
+      <p:grpSpPr>
+        <a:xfrm>
+          <a:off x="0" y="0"/>
+          <a:ext cx="0" cy="0"/>
+          <a:chOff x="0" y="0"/>
+          <a:chExt cx="0" cy="0"/>
+        </a:xfrm>
+      </p:grpSpPr>
+      <p:sp>
+        <p:nvSpPr>
+          <p:cNvPr id="204" name="Google Shape;204;p48"/>
+          <p:cNvSpPr/>
+          <p:nvPr/>
+        </p:nvSpPr>
+        <p:spPr>
+          <a:xfrm>
+            <a:off x="630000" y="2703050"/>
+            <a:ext cx="1033800" cy="1983600"/>
+          </a:xfrm>
+          <a:prstGeom prst="rect">
+            <a:avLst/>
+          </a:prstGeom>
+          <a:solidFill>
+            <a:schemeClr val="accent4"/>
+          </a:solidFill>
+          <a:ln>
+            <a:noFill/>
+          </a:ln>
+        </p:spPr>
+        <p:txBody>
+          <a:bodyPr spcFirstLastPara="1" wrap="square" lIns="91425" tIns="91425" rIns="91425" bIns="91425" anchor="ctr" anchorCtr="0">
+            <a:noAutofit/>
+          </a:bodyPr>
+          <a:lstStyle/>
+          <a:p>
+            <a:pPr marL="0" lvl="0" indent="0" algn="l" rtl="0">
+              <a:spcBef>
+                <a:spcPts val="0"/>
+              </a:spcBef>
+              <a:spcAft>
+                <a:spcPts val="0"/>
+              </a:spcAft>
+              <a:buNone/>
+            </a:pPr>
+            <a:endParaRPr/>
+          </a:p>
+        </p:txBody>
+      </p:sp>
+      <p:sp>
+        <p:nvSpPr>
+          <p:cNvPr id="206" name="Google Shape;206;p48"/>
+          <p:cNvSpPr txBox="1">
+            <a:spLocks noGrp="1"/>
+          </p:cNvSpPr>
+          <p:nvPr>
+            <p:ph type="title"/>
+          </p:nvPr>
+        </p:nvSpPr>
+        <p:spPr>
+          <a:xfrm>
+            <a:off x="500550" y="821219"/>
+            <a:ext cx="8520600" cy="1032900"/>
+          </a:xfrm>
+          <a:prstGeom prst="rect">
+            <a:avLst/>
+          </a:prstGeom>
+        </p:spPr>
+        <p:txBody>
+          <a:bodyPr spcFirstLastPara="1" wrap="square" lIns="91425" tIns="91425" rIns="91425" bIns="91425" anchor="t" anchorCtr="0">
+            <a:noAutofit/>
+          </a:bodyPr>
+          <a:lstStyle/>
+          <a:p>
+            <a:pPr marL="0" lvl="0" indent="0" algn="l" rtl="0">
+              <a:spcBef>
+                <a:spcPts val="0"/>
+              </a:spcBef>
+              <a:spcAft>
+                <a:spcPts val="0"/>
+              </a:spcAft>
+              <a:buClr>
+                <a:schemeClr val="dk1"/>
+              </a:buClr>
+              <a:buSzPts val="1100"/>
+              <a:buFont typeface="Arial"/>
+              <a:buNone/>
+            </a:pPr>
+            <a:r>
+              <a:rPr lang="ru-RU" sz="3200" dirty="0"/>
+              <a:t>Введение в вероятностное моделирование</a:t>
+            </a:r>
+            <a:br>
+              <a:rPr lang="en-US" sz="3200" dirty="0"/>
+            </a:br>
+            <a:r>
+              <a:rPr lang="ru-RU" sz="2400" b="0" dirty="0"/>
+              <a:t>апостериорные оценки, </a:t>
+            </a:r>
+            <a:r>
+              <a:rPr lang="ru-RU" sz="2400" b="0" dirty="0" err="1"/>
+              <a:t>сэмплирование</a:t>
+            </a:r>
+            <a:r>
+              <a:rPr lang="ru-RU" sz="2400" b="0" dirty="0"/>
+              <a:t> </a:t>
+            </a:r>
+            <a:br>
+              <a:rPr lang="en-US" sz="2400" b="0" dirty="0"/>
+            </a:br>
+            <a:endParaRPr b="0" dirty="0"/>
+          </a:p>
+          <a:p>
+            <a:pPr marL="0" lvl="0" indent="0" algn="l" rtl="0">
+              <a:spcBef>
+                <a:spcPts val="0"/>
+              </a:spcBef>
+              <a:spcAft>
+                <a:spcPts val="0"/>
+              </a:spcAft>
+              <a:buNone/>
+            </a:pPr>
+            <a:endParaRPr dirty="0"/>
+          </a:p>
+        </p:txBody>
+      </p:sp>
+      <p:sp>
+        <p:nvSpPr>
+          <p:cNvPr id="207" name="Google Shape;207;p48"/>
+          <p:cNvSpPr txBox="1">
+            <a:spLocks noGrp="1"/>
+          </p:cNvSpPr>
+          <p:nvPr>
+            <p:ph type="subTitle" idx="1"/>
+          </p:nvPr>
+        </p:nvSpPr>
+        <p:spPr>
+          <a:xfrm>
+            <a:off x="500550" y="520133"/>
+            <a:ext cx="7796700" cy="356926"/>
+          </a:xfrm>
+          <a:prstGeom prst="rect">
+            <a:avLst/>
+          </a:prstGeom>
+        </p:spPr>
+        <p:txBody>
+          <a:bodyPr spcFirstLastPara="1" wrap="square" lIns="91425" tIns="91425" rIns="91425" bIns="91425" anchor="t" anchorCtr="0">
+            <a:normAutofit fontScale="92500" lnSpcReduction="20000"/>
+          </a:bodyPr>
+          <a:lstStyle/>
+          <a:p>
+            <a:pPr marL="0" lvl="0" indent="0" algn="l" rtl="0">
+              <a:spcBef>
+                <a:spcPts val="0"/>
+              </a:spcBef>
+              <a:spcAft>
+                <a:spcPts val="0"/>
+              </a:spcAft>
+              <a:buNone/>
+            </a:pPr>
+            <a:r>
+              <a:rPr lang="ru" dirty="0"/>
+              <a:t>Тема вебинара</a:t>
+            </a:r>
+            <a:endParaRPr dirty="0"/>
+          </a:p>
+        </p:txBody>
+      </p:sp>
+      <p:sp>
+        <p:nvSpPr>
+          <p:cNvPr id="208" name="Google Shape;208;p48"/>
+          <p:cNvSpPr txBox="1">
+            <a:spLocks noGrp="1"/>
+          </p:cNvSpPr>
+          <p:nvPr>
+            <p:ph type="subTitle" idx="2"/>
+          </p:nvPr>
+        </p:nvSpPr>
+        <p:spPr>
+          <a:xfrm>
+            <a:off x="3082400" y="2703052"/>
+            <a:ext cx="5856300" cy="396900"/>
+          </a:xfrm>
+          <a:prstGeom prst="rect">
+            <a:avLst/>
+          </a:prstGeom>
+        </p:spPr>
+        <p:txBody>
+          <a:bodyPr spcFirstLastPara="1" wrap="square" lIns="91425" tIns="91425" rIns="91425" bIns="91425" anchor="t" anchorCtr="0">
+            <a:normAutofit lnSpcReduction="10000"/>
+          </a:bodyPr>
+          <a:lstStyle/>
+          <a:p>
+            <a:pPr marL="0" lvl="0" indent="0" algn="l" rtl="0">
+              <a:spcBef>
+                <a:spcPts val="0"/>
+              </a:spcBef>
+              <a:spcAft>
+                <a:spcPts val="0"/>
+              </a:spcAft>
+              <a:buNone/>
+            </a:pPr>
+            <a:r>
+              <a:rPr lang="ru" dirty="0"/>
+              <a:t>Игорь Стурейко</a:t>
+            </a:r>
+            <a:endParaRPr dirty="0"/>
+          </a:p>
+        </p:txBody>
+      </p:sp>
+      <p:sp>
+        <p:nvSpPr>
+          <p:cNvPr id="209" name="Google Shape;209;p48"/>
+          <p:cNvSpPr txBox="1">
+            <a:spLocks noGrp="1"/>
+          </p:cNvSpPr>
+          <p:nvPr>
+            <p:ph type="subTitle" idx="3"/>
+          </p:nvPr>
+        </p:nvSpPr>
+        <p:spPr>
+          <a:xfrm>
+            <a:off x="3082400" y="3162350"/>
+            <a:ext cx="5095500" cy="1524300"/>
+          </a:xfrm>
+          <a:prstGeom prst="rect">
+            <a:avLst/>
+          </a:prstGeom>
+        </p:spPr>
+        <p:txBody>
+          <a:bodyPr spcFirstLastPara="1" wrap="square" lIns="91425" tIns="91425" rIns="91425" bIns="91425" anchor="t" anchorCtr="0">
+            <a:normAutofit fontScale="85000" lnSpcReduction="20000"/>
+          </a:bodyPr>
+          <a:lstStyle/>
+          <a:p>
+            <a:pPr marL="0" marR="0" lvl="0" indent="0" algn="l" rtl="0">
+              <a:lnSpc>
+                <a:spcPct val="100000"/>
+              </a:lnSpc>
+              <a:spcBef>
+                <a:spcPts val="0"/>
+              </a:spcBef>
+              <a:spcAft>
+                <a:spcPts val="0"/>
+              </a:spcAft>
+              <a:buNone/>
+            </a:pPr>
+            <a:r>
+              <a:rPr lang="en-US" sz="1150" b="1" dirty="0" err="1"/>
+              <a:t>Teamlead</a:t>
+            </a:r>
+            <a:r>
+              <a:rPr lang="ru-RU" sz="1150" b="1" dirty="0"/>
+              <a:t>, главный инженер проекта –</a:t>
+            </a:r>
+            <a:r>
+              <a:rPr lang="en-US" sz="1150" b="1" dirty="0"/>
+              <a:t> </a:t>
+            </a:r>
+            <a:r>
+              <a:rPr lang="ru-RU" sz="1150" b="1" dirty="0" err="1"/>
+              <a:t>НИИгазэкономика</a:t>
+            </a:r>
+            <a:endParaRPr sz="1150" b="1" dirty="0"/>
+          </a:p>
+          <a:p>
+            <a:pPr marL="0" marR="0" lvl="0" indent="0" algn="l" rtl="0">
+              <a:lnSpc>
+                <a:spcPct val="100000"/>
+              </a:lnSpc>
+              <a:spcBef>
+                <a:spcPts val="0"/>
+              </a:spcBef>
+              <a:spcAft>
+                <a:spcPts val="0"/>
+              </a:spcAft>
+              <a:buNone/>
+            </a:pPr>
+            <a:endParaRPr sz="1150" dirty="0"/>
+          </a:p>
+          <a:p>
+            <a:pPr marL="0" marR="0" lvl="0" indent="0" algn="l" rtl="0">
+              <a:lnSpc>
+                <a:spcPct val="100000"/>
+              </a:lnSpc>
+              <a:spcBef>
+                <a:spcPts val="0"/>
+              </a:spcBef>
+              <a:spcAft>
+                <a:spcPts val="0"/>
+              </a:spcAft>
+              <a:buNone/>
+            </a:pPr>
+            <a:r>
+              <a:rPr lang="ru" sz="1150" b="1" dirty="0"/>
+              <a:t>Опыт:</a:t>
+            </a:r>
+            <a:endParaRPr sz="1150" dirty="0"/>
+          </a:p>
+          <a:p>
+            <a:pPr marL="0" marR="0" lvl="0" indent="0" algn="l" rtl="0">
+              <a:lnSpc>
+                <a:spcPct val="100000"/>
+              </a:lnSpc>
+              <a:spcBef>
+                <a:spcPts val="0"/>
+              </a:spcBef>
+              <a:spcAft>
+                <a:spcPts val="0"/>
+              </a:spcAft>
+              <a:buNone/>
+            </a:pPr>
+            <a:r>
+              <a:rPr lang="ru-RU" sz="1150" dirty="0"/>
+              <a:t>Б</a:t>
+            </a:r>
+            <a:r>
+              <a:rPr lang="ru" sz="1150" dirty="0"/>
+              <a:t>олее 15 лет занимался прикладной математикой и мат моделированием</a:t>
+            </a:r>
+          </a:p>
+          <a:p>
+            <a:pPr marL="0" marR="0" lvl="0" indent="0" algn="l" rtl="0">
+              <a:lnSpc>
+                <a:spcPct val="100000"/>
+              </a:lnSpc>
+              <a:spcBef>
+                <a:spcPts val="0"/>
+              </a:spcBef>
+              <a:spcAft>
+                <a:spcPts val="0"/>
+              </a:spcAft>
+              <a:buNone/>
+            </a:pPr>
+            <a:r>
+              <a:rPr lang="ru" sz="1150" dirty="0"/>
+              <a:t>(Data Scientist) (Python, С++) в НИИ ПАО Газпром</a:t>
+            </a:r>
+            <a:endParaRPr sz="1150" dirty="0"/>
+          </a:p>
+          <a:p>
+            <a:pPr marL="0" marR="0" lvl="0" indent="0" algn="l" rtl="0">
+              <a:lnSpc>
+                <a:spcPct val="100000"/>
+              </a:lnSpc>
+              <a:spcBef>
+                <a:spcPts val="0"/>
+              </a:spcBef>
+              <a:spcAft>
+                <a:spcPts val="0"/>
+              </a:spcAft>
+              <a:buNone/>
+            </a:pPr>
+            <a:endParaRPr sz="1150" dirty="0"/>
+          </a:p>
+          <a:p>
+            <a:pPr marL="0" marR="0" lvl="0" indent="0" algn="l" rtl="0">
+              <a:lnSpc>
+                <a:spcPct val="100000"/>
+              </a:lnSpc>
+              <a:spcBef>
+                <a:spcPts val="0"/>
+              </a:spcBef>
+              <a:spcAft>
+                <a:spcPts val="0"/>
+              </a:spcAft>
+              <a:buNone/>
+            </a:pPr>
+            <a:r>
+              <a:rPr lang="ru" sz="1150" dirty="0"/>
+              <a:t>Анализ временных рядов, эволюционное развитие сложных систем</a:t>
+            </a:r>
+            <a:endParaRPr sz="1150" dirty="0"/>
+          </a:p>
+          <a:p>
+            <a:pPr marL="0" marR="0" lvl="0" indent="0" algn="l" rtl="0">
+              <a:lnSpc>
+                <a:spcPct val="100000"/>
+              </a:lnSpc>
+              <a:spcBef>
+                <a:spcPts val="0"/>
+              </a:spcBef>
+              <a:spcAft>
+                <a:spcPts val="0"/>
+              </a:spcAft>
+              <a:buNone/>
+            </a:pPr>
+            <a:endParaRPr sz="1150" dirty="0"/>
+          </a:p>
+          <a:p>
+            <a:pPr marL="0" marR="0" lvl="0" indent="0" algn="l" rtl="0">
+              <a:lnSpc>
+                <a:spcPct val="100000"/>
+              </a:lnSpc>
+              <a:spcBef>
+                <a:spcPts val="0"/>
+              </a:spcBef>
+              <a:spcAft>
+                <a:spcPts val="0"/>
+              </a:spcAft>
+              <a:buNone/>
+            </a:pPr>
+            <a:r>
+              <a:rPr lang="ru-RU" sz="1150" b="1" dirty="0"/>
+              <a:t>+7 (916) 156-07-82 (</a:t>
+            </a:r>
+            <a:r>
+              <a:rPr lang="en-US" sz="1150" b="1" dirty="0" err="1"/>
+              <a:t>whatsapp</a:t>
+            </a:r>
+            <a:r>
+              <a:rPr lang="en-US" sz="1150" b="1" dirty="0"/>
+              <a:t>)</a:t>
+            </a:r>
+          </a:p>
+          <a:p>
+            <a:pPr marL="0" marR="0" lvl="0" indent="0" algn="l" rtl="0">
+              <a:lnSpc>
+                <a:spcPct val="100000"/>
+              </a:lnSpc>
+              <a:spcBef>
+                <a:spcPts val="0"/>
+              </a:spcBef>
+              <a:spcAft>
+                <a:spcPts val="0"/>
+              </a:spcAft>
+              <a:buNone/>
+            </a:pPr>
+            <a:endParaRPr lang="en-US" sz="1150" b="1" dirty="0"/>
+          </a:p>
+          <a:p>
+            <a:pPr marL="0" marR="0" lvl="0" indent="0" algn="l" rtl="0">
+              <a:lnSpc>
+                <a:spcPct val="100000"/>
+              </a:lnSpc>
+              <a:spcBef>
+                <a:spcPts val="0"/>
+              </a:spcBef>
+              <a:spcAft>
+                <a:spcPts val="0"/>
+              </a:spcAft>
+              <a:buNone/>
+            </a:pPr>
+            <a:r>
+              <a:rPr lang="en-US" sz="1150" b="1" dirty="0"/>
+              <a:t>@</a:t>
+            </a:r>
+            <a:r>
+              <a:rPr lang="en-US" sz="1150" b="1" dirty="0" err="1"/>
+              <a:t>stureiko</a:t>
+            </a:r>
+            <a:r>
+              <a:rPr lang="en-US" sz="1150" b="1" dirty="0"/>
+              <a:t> (TG)</a:t>
+            </a:r>
+            <a:endParaRPr sz="1150" b="1" dirty="0"/>
+          </a:p>
+          <a:p>
+            <a:pPr marL="0" marR="0" lvl="0" indent="0" algn="l" rtl="0">
+              <a:lnSpc>
+                <a:spcPct val="100000"/>
+              </a:lnSpc>
+              <a:spcBef>
+                <a:spcPts val="0"/>
+              </a:spcBef>
+              <a:spcAft>
+                <a:spcPts val="0"/>
+              </a:spcAft>
+              <a:buNone/>
+            </a:pPr>
+            <a:endParaRPr sz="1400" dirty="0"/>
+          </a:p>
+        </p:txBody>
+      </p:sp>
+      <p:sp>
+        <p:nvSpPr>
+          <p:cNvPr id="5" name="Oval 4">
+            <a:extLst>
+              <a:ext uri="{FF2B5EF4-FFF2-40B4-BE49-F238E27FC236}">
+                <a16:creationId xmlns:a16="http://schemas.microsoft.com/office/drawing/2014/main" id="{499A103C-F3B2-9942-BE61-45E26582D7F9}"/>
+              </a:ext>
+            </a:extLst>
+          </p:cNvPr>
+          <p:cNvSpPr/>
+          <p:nvPr/>
+        </p:nvSpPr>
+        <p:spPr>
+          <a:xfrm>
+            <a:off x="827107" y="2871470"/>
+            <a:ext cx="1673385" cy="1646760"/>
+          </a:xfrm>
+          <a:prstGeom prst="ellipse">
+            <a:avLst/>
+          </a:prstGeom>
+          <a:blipFill>
+            <a:blip r:embed="rId3"/>
+            <a:stretch>
+              <a:fillRect/>
+            </a:stretch>
+          </a:blipFill>
+          <a:ln w="12700">
+            <a:solidFill>
+              <a:schemeClr val="tx1"/>
+            </a:solidFill>
+          </a:ln>
+        </p:spPr>
+        <p:style>
+          <a:lnRef idx="2">
+            <a:schemeClr val="accent1">
+              <a:shade val="50000"/>
+            </a:schemeClr>
+          </a:lnRef>
+          <a:fillRef idx="1">
+            <a:schemeClr val="accent1"/>
+          </a:fillRef>
+          <a:effectRef idx="0">
+            <a:schemeClr val="accent1"/>
+          </a:effectRef>
+          <a:fontRef idx="minor">
+            <a:schemeClr val="lt1"/>
+          </a:fontRef>
+        </p:style>
+        <p:txBody>
+          <a:bodyPr rtlCol="0" anchor="ctr"/>
+          <a:lstStyle/>
+          <a:p>
+            <a:pPr algn="ctr"/>
+            <a:endParaRPr lang="en-RU"/>
+          </a:p>
+        </p:txBody>
+      </p:sp>
+    </p:spTree>
+  </p:cSld>
+  <p:clrMapOvr>
+    <a:masterClrMapping/>
+  </p:clrMapOvr>
+</p:sld>
+</file>
+
+<file path=ppt/slides/slide30.xml><?xml version="1.0" encoding="utf-8"?>
 <p:sld xmlns:a="http://schemas.openxmlformats.org/drawingml/2006/main" xmlns:r="http://schemas.openxmlformats.org/officeDocument/2006/relationships" xmlns:p="http://schemas.openxmlformats.org/presentationml/2006/main">
   <p:cSld>
     <p:spTree>
@@ -36650,6 +37798,350 @@
           </p:sp>
         </mc:Fallback>
       </mc:AlternateContent>
+      <mc:AlternateContent xmlns:mc="http://schemas.openxmlformats.org/markup-compatibility/2006">
+        <mc:Choice xmlns:a14="http://schemas.microsoft.com/office/drawing/2010/main" Requires="a14">
+          <p:sp>
+            <p:nvSpPr>
+              <p:cNvPr id="5" name="TextBox 4">
+                <a:extLst>
+                  <a:ext uri="{FF2B5EF4-FFF2-40B4-BE49-F238E27FC236}">
+                    <a16:creationId xmlns:a16="http://schemas.microsoft.com/office/drawing/2014/main" id="{3AF8940A-22FD-5F48-BBE3-5883EE5156B4}"/>
+                  </a:ext>
+                </a:extLst>
+              </p:cNvPr>
+              <p:cNvSpPr txBox="1"/>
+              <p:nvPr/>
+            </p:nvSpPr>
+            <p:spPr>
+              <a:xfrm>
+                <a:off x="800889" y="2162343"/>
+                <a:ext cx="7170157" cy="818814"/>
+              </a:xfrm>
+              <a:prstGeom prst="rect">
+                <a:avLst/>
+              </a:prstGeom>
+              <a:noFill/>
+            </p:spPr>
+            <p:txBody>
+              <a:bodyPr wrap="square">
+                <a:spAutoFit/>
+              </a:bodyPr>
+              <a:lstStyle/>
+              <a:p>
+                <a:pPr/>
+                <a14:m>
+                  <m:oMathPara xmlns:m="http://schemas.openxmlformats.org/officeDocument/2006/math">
+                    <m:oMathParaPr>
+                      <m:jc m:val="centerGroup"/>
+                    </m:oMathParaPr>
+                    <m:oMath xmlns:m="http://schemas.openxmlformats.org/officeDocument/2006/math">
+                      <m:r>
+                        <a:rPr lang="en-US" sz="1800" b="0" i="1" smtClean="0">
+                          <a:latin typeface="Cambria Math" panose="02040503050406030204" pitchFamily="18" charset="0"/>
+                        </a:rPr>
+                        <m:t>𝑝</m:t>
+                      </m:r>
+                      <m:d>
+                        <m:dPr>
+                          <m:ctrlPr>
+                            <a:rPr lang="en-US" sz="1800" b="0" i="1" smtClean="0">
+                              <a:latin typeface="Cambria Math" panose="02040503050406030204" pitchFamily="18" charset="0"/>
+                            </a:rPr>
+                          </m:ctrlPr>
+                        </m:dPr>
+                        <m:e>
+                          <m:r>
+                            <a:rPr lang="en-US" sz="1800" b="0" i="1" smtClean="0">
+                              <a:latin typeface="Cambria Math" panose="02040503050406030204" pitchFamily="18" charset="0"/>
+                            </a:rPr>
+                            <m:t>𝑦</m:t>
+                          </m:r>
+                        </m:e>
+                        <m:e>
+                          <m:r>
+                            <a:rPr lang="en-US" sz="1800" b="0" i="1" smtClean="0">
+                              <a:latin typeface="Cambria Math" panose="02040503050406030204" pitchFamily="18" charset="0"/>
+                            </a:rPr>
+                            <m:t>𝑥</m:t>
+                          </m:r>
+                          <m:r>
+                            <a:rPr lang="en-US" sz="1800" b="0" i="1" smtClean="0">
+                              <a:latin typeface="Cambria Math" panose="02040503050406030204" pitchFamily="18" charset="0"/>
+                            </a:rPr>
+                            <m:t>,</m:t>
+                          </m:r>
+                          <m:sSub>
+                            <m:sSubPr>
+                              <m:ctrlPr>
+                                <a:rPr lang="en-US" sz="1800" i="1">
+                                  <a:latin typeface="Cambria Math" panose="02040503050406030204" pitchFamily="18" charset="0"/>
+                                </a:rPr>
+                              </m:ctrlPr>
+                            </m:sSubPr>
+                            <m:e>
+                              <m:r>
+                                <a:rPr lang="en-US" sz="1800" i="1">
+                                  <a:latin typeface="Cambria Math" panose="02040503050406030204" pitchFamily="18" charset="0"/>
+                                </a:rPr>
+                                <m:t>𝑋</m:t>
+                              </m:r>
+                            </m:e>
+                            <m:sub>
+                              <m:r>
+                                <a:rPr lang="en-US" sz="1800" i="1">
+                                  <a:latin typeface="Cambria Math" panose="02040503050406030204" pitchFamily="18" charset="0"/>
+                                </a:rPr>
+                                <m:t>𝑡𝑟</m:t>
+                              </m:r>
+                            </m:sub>
+                          </m:sSub>
+                          <m:r>
+                            <a:rPr lang="en-US" sz="1800" i="1">
+                              <a:latin typeface="Cambria Math" panose="02040503050406030204" pitchFamily="18" charset="0"/>
+                            </a:rPr>
+                            <m:t>,</m:t>
+                          </m:r>
+                          <m:sSub>
+                            <m:sSubPr>
+                              <m:ctrlPr>
+                                <a:rPr lang="en-US" sz="1800" i="1">
+                                  <a:latin typeface="Cambria Math" panose="02040503050406030204" pitchFamily="18" charset="0"/>
+                                </a:rPr>
+                              </m:ctrlPr>
+                            </m:sSubPr>
+                            <m:e>
+                              <m:r>
+                                <a:rPr lang="en-US" sz="1800" i="1">
+                                  <a:latin typeface="Cambria Math" panose="02040503050406030204" pitchFamily="18" charset="0"/>
+                                </a:rPr>
+                                <m:t>𝑌</m:t>
+                              </m:r>
+                            </m:e>
+                            <m:sub>
+                              <m:r>
+                                <a:rPr lang="en-US" sz="1800" i="1">
+                                  <a:latin typeface="Cambria Math" panose="02040503050406030204" pitchFamily="18" charset="0"/>
+                                </a:rPr>
+                                <m:t>𝑡𝑟</m:t>
+                              </m:r>
+                            </m:sub>
+                          </m:sSub>
+                        </m:e>
+                      </m:d>
+                      <m:r>
+                        <a:rPr lang="en-US" sz="1800" b="0" i="1" smtClean="0">
+                          <a:latin typeface="Cambria Math" panose="02040503050406030204" pitchFamily="18" charset="0"/>
+                        </a:rPr>
+                        <m:t>= </m:t>
+                      </m:r>
+                      <m:nary>
+                        <m:naryPr>
+                          <m:limLoc m:val="undOvr"/>
+                          <m:subHide m:val="on"/>
+                          <m:supHide m:val="on"/>
+                          <m:ctrlPr>
+                            <a:rPr lang="en-RU" sz="1800" i="1" smtClean="0">
+                              <a:latin typeface="Cambria Math" panose="02040503050406030204" pitchFamily="18" charset="0"/>
+                            </a:rPr>
+                          </m:ctrlPr>
+                        </m:naryPr>
+                        <m:sub/>
+                        <m:sup/>
+                        <m:e>
+                          <m:r>
+                            <a:rPr lang="en-US" sz="1800" b="0" i="1" smtClean="0">
+                              <a:latin typeface="Cambria Math" panose="02040503050406030204" pitchFamily="18" charset="0"/>
+                            </a:rPr>
+                            <m:t>𝑝</m:t>
+                          </m:r>
+                          <m:d>
+                            <m:dPr>
+                              <m:ctrlPr>
+                                <a:rPr lang="en-US" sz="1800" b="0" i="1" smtClean="0">
+                                  <a:latin typeface="Cambria Math" panose="02040503050406030204" pitchFamily="18" charset="0"/>
+                                </a:rPr>
+                              </m:ctrlPr>
+                            </m:dPr>
+                            <m:e>
+                              <m:r>
+                                <a:rPr lang="en-US" sz="1800" b="0" i="1" smtClean="0">
+                                  <a:latin typeface="Cambria Math" panose="02040503050406030204" pitchFamily="18" charset="0"/>
+                                </a:rPr>
+                                <m:t>𝑦</m:t>
+                              </m:r>
+                            </m:e>
+                            <m:e>
+                              <m:r>
+                                <a:rPr lang="en-US" sz="1800" b="0" i="1" smtClean="0">
+                                  <a:latin typeface="Cambria Math" panose="02040503050406030204" pitchFamily="18" charset="0"/>
+                                </a:rPr>
+                                <m:t>𝑥</m:t>
+                              </m:r>
+                              <m:r>
+                                <a:rPr lang="en-US" sz="1800" b="0" i="1" smtClean="0">
+                                  <a:latin typeface="Cambria Math" panose="02040503050406030204" pitchFamily="18" charset="0"/>
+                                </a:rPr>
+                                <m:t>, </m:t>
+                              </m:r>
+                              <m:r>
+                                <a:rPr lang="en-US" sz="1800" b="0" i="1" smtClean="0">
+                                  <a:latin typeface="Cambria Math" panose="02040503050406030204" pitchFamily="18" charset="0"/>
+                                </a:rPr>
+                                <m:t>𝜃</m:t>
+                              </m:r>
+                            </m:e>
+                          </m:d>
+                          <m:r>
+                            <a:rPr lang="en-US" sz="1800" b="0" i="1" smtClean="0">
+                              <a:latin typeface="Cambria Math" panose="02040503050406030204" pitchFamily="18" charset="0"/>
+                            </a:rPr>
+                            <m:t>𝑝</m:t>
+                          </m:r>
+                          <m:d>
+                            <m:dPr>
+                              <m:ctrlPr>
+                                <a:rPr lang="en-US" sz="1800" b="0" i="1" smtClean="0">
+                                  <a:latin typeface="Cambria Math" panose="02040503050406030204" pitchFamily="18" charset="0"/>
+                                </a:rPr>
+                              </m:ctrlPr>
+                            </m:dPr>
+                            <m:e>
+                              <m:r>
+                                <a:rPr lang="en-US" sz="1800" b="0" i="1" smtClean="0">
+                                  <a:latin typeface="Cambria Math" panose="02040503050406030204" pitchFamily="18" charset="0"/>
+                                </a:rPr>
+                                <m:t>𝜃</m:t>
+                              </m:r>
+                            </m:e>
+                            <m:e>
+                              <m:sSub>
+                                <m:sSubPr>
+                                  <m:ctrlPr>
+                                    <a:rPr lang="en-US" sz="1800" b="0" i="1" smtClean="0">
+                                      <a:latin typeface="Cambria Math" panose="02040503050406030204" pitchFamily="18" charset="0"/>
+                                    </a:rPr>
+                                  </m:ctrlPr>
+                                </m:sSubPr>
+                                <m:e>
+                                  <m:r>
+                                    <a:rPr lang="en-US" sz="1800" b="0" i="1" smtClean="0">
+                                      <a:latin typeface="Cambria Math" panose="02040503050406030204" pitchFamily="18" charset="0"/>
+                                    </a:rPr>
+                                    <m:t>𝑋</m:t>
+                                  </m:r>
+                                </m:e>
+                                <m:sub>
+                                  <m:r>
+                                    <a:rPr lang="en-US" sz="1800" b="0" i="1" smtClean="0">
+                                      <a:latin typeface="Cambria Math" panose="02040503050406030204" pitchFamily="18" charset="0"/>
+                                    </a:rPr>
+                                    <m:t>𝑡𝑟</m:t>
+                                  </m:r>
+                                </m:sub>
+                              </m:sSub>
+                              <m:r>
+                                <a:rPr lang="en-US" sz="1800" b="0" i="1" smtClean="0">
+                                  <a:latin typeface="Cambria Math" panose="02040503050406030204" pitchFamily="18" charset="0"/>
+                                </a:rPr>
+                                <m:t>,</m:t>
+                              </m:r>
+                              <m:sSub>
+                                <m:sSubPr>
+                                  <m:ctrlPr>
+                                    <a:rPr lang="en-US" sz="1800" i="1">
+                                      <a:latin typeface="Cambria Math" panose="02040503050406030204" pitchFamily="18" charset="0"/>
+                                    </a:rPr>
+                                  </m:ctrlPr>
+                                </m:sSubPr>
+                                <m:e>
+                                  <m:r>
+                                    <a:rPr lang="en-US" sz="1800" b="0" i="1" smtClean="0">
+                                      <a:latin typeface="Cambria Math" panose="02040503050406030204" pitchFamily="18" charset="0"/>
+                                    </a:rPr>
+                                    <m:t>𝑌</m:t>
+                                  </m:r>
+                                </m:e>
+                                <m:sub>
+                                  <m:r>
+                                    <a:rPr lang="en-US" sz="1800" i="1">
+                                      <a:latin typeface="Cambria Math" panose="02040503050406030204" pitchFamily="18" charset="0"/>
+                                    </a:rPr>
+                                    <m:t>𝑡𝑟</m:t>
+                                  </m:r>
+                                </m:sub>
+                              </m:sSub>
+                            </m:e>
+                          </m:d>
+                          <m:r>
+                            <m:rPr>
+                              <m:sty m:val="p"/>
+                            </m:rPr>
+                            <a:rPr lang="en-US" sz="1800" b="0" i="0" smtClean="0">
+                              <a:latin typeface="Cambria Math" panose="02040503050406030204" pitchFamily="18" charset="0"/>
+                            </a:rPr>
+                            <m:t>d</m:t>
+                          </m:r>
+                          <m:r>
+                            <a:rPr lang="en-US" sz="1800" b="0" i="1" smtClean="0">
+                              <a:latin typeface="Cambria Math" panose="02040503050406030204" pitchFamily="18" charset="0"/>
+                            </a:rPr>
+                            <m:t>𝜃</m:t>
+                          </m:r>
+                        </m:e>
+                      </m:nary>
+                    </m:oMath>
+                  </m:oMathPara>
+                </a14:m>
+                <a:endParaRPr lang="en-RU" sz="1800" dirty="0"/>
+              </a:p>
+            </p:txBody>
+          </p:sp>
+        </mc:Choice>
+        <mc:Fallback>
+          <p:sp>
+            <p:nvSpPr>
+              <p:cNvPr id="5" name="TextBox 4">
+                <a:extLst>
+                  <a:ext uri="{FF2B5EF4-FFF2-40B4-BE49-F238E27FC236}">
+                    <a16:creationId xmlns:a16="http://schemas.microsoft.com/office/drawing/2014/main" id="{3AF8940A-22FD-5F48-BBE3-5883EE5156B4}"/>
+                  </a:ext>
+                </a:extLst>
+              </p:cNvPr>
+              <p:cNvSpPr txBox="1">
+                <a:spLocks noRot="1" noChangeAspect="1" noMove="1" noResize="1" noEditPoints="1" noAdjustHandles="1" noChangeArrowheads="1" noChangeShapeType="1" noTextEdit="1"/>
+              </p:cNvSpPr>
+              <p:nvPr/>
+            </p:nvSpPr>
+            <p:spPr>
+              <a:xfrm>
+                <a:off x="800889" y="2162343"/>
+                <a:ext cx="7170157" cy="818814"/>
+              </a:xfrm>
+              <a:prstGeom prst="rect">
+                <a:avLst/>
+              </a:prstGeom>
+              <a:blipFill>
+                <a:blip r:embed="rId4"/>
+                <a:stretch>
+                  <a:fillRect t="-132308" b="-190769"/>
+                </a:stretch>
+              </a:blipFill>
+            </p:spPr>
+            <p:txBody>
+              <a:bodyPr/>
+              <a:lstStyle/>
+              <a:p>
+                <a:r>
+                  <a:rPr lang="en-RU">
+                    <a:noFill/>
+                  </a:rPr>
+                  <a:t> </a:t>
+                </a:r>
+              </a:p>
+            </p:txBody>
+          </p:sp>
+        </mc:Fallback>
+      </mc:AlternateContent>
     </p:spTree>
     <p:extLst>
       <p:ext uri="{BB962C8B-B14F-4D97-AF65-F5344CB8AC3E}">
@@ -36663,554 +38155,7 @@
 </p:sld>
 </file>
 
-<file path=ppt/slides/slide3.xml><?xml version="1.0" encoding="utf-8"?>
-<p:sld xmlns:a="http://schemas.openxmlformats.org/drawingml/2006/main" xmlns:r="http://schemas.openxmlformats.org/officeDocument/2006/relationships" xmlns:p="http://schemas.openxmlformats.org/presentationml/2006/main">
-  <p:cSld>
-    <p:spTree>
-      <p:nvGrpSpPr>
-        <p:cNvPr id="1" name="Shape 203"/>
-        <p:cNvGrpSpPr/>
-        <p:nvPr/>
-      </p:nvGrpSpPr>
-      <p:grpSpPr>
-        <a:xfrm>
-          <a:off x="0" y="0"/>
-          <a:ext cx="0" cy="0"/>
-          <a:chOff x="0" y="0"/>
-          <a:chExt cx="0" cy="0"/>
-        </a:xfrm>
-      </p:grpSpPr>
-      <p:sp>
-        <p:nvSpPr>
-          <p:cNvPr id="204" name="Google Shape;204;p48"/>
-          <p:cNvSpPr/>
-          <p:nvPr/>
-        </p:nvSpPr>
-        <p:spPr>
-          <a:xfrm>
-            <a:off x="630000" y="2703050"/>
-            <a:ext cx="1033800" cy="1983600"/>
-          </a:xfrm>
-          <a:prstGeom prst="rect">
-            <a:avLst/>
-          </a:prstGeom>
-          <a:solidFill>
-            <a:schemeClr val="accent4"/>
-          </a:solidFill>
-          <a:ln>
-            <a:noFill/>
-          </a:ln>
-        </p:spPr>
-        <p:txBody>
-          <a:bodyPr spcFirstLastPara="1" wrap="square" lIns="91425" tIns="91425" rIns="91425" bIns="91425" anchor="ctr" anchorCtr="0">
-            <a:noAutofit/>
-          </a:bodyPr>
-          <a:lstStyle/>
-          <a:p>
-            <a:pPr marL="0" lvl="0" indent="0" algn="l" rtl="0">
-              <a:spcBef>
-                <a:spcPts val="0"/>
-              </a:spcBef>
-              <a:spcAft>
-                <a:spcPts val="0"/>
-              </a:spcAft>
-              <a:buNone/>
-            </a:pPr>
-            <a:endParaRPr/>
-          </a:p>
-        </p:txBody>
-      </p:sp>
-      <p:sp>
-        <p:nvSpPr>
-          <p:cNvPr id="206" name="Google Shape;206;p48"/>
-          <p:cNvSpPr txBox="1">
-            <a:spLocks noGrp="1"/>
-          </p:cNvSpPr>
-          <p:nvPr>
-            <p:ph type="title"/>
-          </p:nvPr>
-        </p:nvSpPr>
-        <p:spPr>
-          <a:xfrm>
-            <a:off x="500550" y="821219"/>
-            <a:ext cx="8520600" cy="1032900"/>
-          </a:xfrm>
-          <a:prstGeom prst="rect">
-            <a:avLst/>
-          </a:prstGeom>
-        </p:spPr>
-        <p:txBody>
-          <a:bodyPr spcFirstLastPara="1" wrap="square" lIns="91425" tIns="91425" rIns="91425" bIns="91425" anchor="t" anchorCtr="0">
-            <a:noAutofit/>
-          </a:bodyPr>
-          <a:lstStyle/>
-          <a:p>
-            <a:pPr marL="0" lvl="0" indent="0" algn="l" rtl="0">
-              <a:spcBef>
-                <a:spcPts val="0"/>
-              </a:spcBef>
-              <a:spcAft>
-                <a:spcPts val="0"/>
-              </a:spcAft>
-              <a:buClr>
-                <a:schemeClr val="dk1"/>
-              </a:buClr>
-              <a:buSzPts val="1100"/>
-              <a:buFont typeface="Arial"/>
-              <a:buNone/>
-            </a:pPr>
-            <a:r>
-              <a:rPr lang="ru-RU" sz="3200" dirty="0"/>
-              <a:t>Введение в вероятностное моделирование</a:t>
-            </a:r>
-            <a:br>
-              <a:rPr lang="en-US" sz="3200" dirty="0"/>
-            </a:br>
-            <a:r>
-              <a:rPr lang="ru-RU" sz="2400" b="0" dirty="0"/>
-              <a:t>апостериорные оценки, </a:t>
-            </a:r>
-            <a:r>
-              <a:rPr lang="ru-RU" sz="2400" b="0" dirty="0" err="1"/>
-              <a:t>сэмплирование</a:t>
-            </a:r>
-            <a:r>
-              <a:rPr lang="ru-RU" sz="2400" b="0" dirty="0"/>
-              <a:t> </a:t>
-            </a:r>
-            <a:br>
-              <a:rPr lang="en-US" sz="2400" b="0" dirty="0"/>
-            </a:br>
-            <a:endParaRPr b="0" dirty="0"/>
-          </a:p>
-          <a:p>
-            <a:pPr marL="0" lvl="0" indent="0" algn="l" rtl="0">
-              <a:spcBef>
-                <a:spcPts val="0"/>
-              </a:spcBef>
-              <a:spcAft>
-                <a:spcPts val="0"/>
-              </a:spcAft>
-              <a:buNone/>
-            </a:pPr>
-            <a:endParaRPr dirty="0"/>
-          </a:p>
-        </p:txBody>
-      </p:sp>
-      <p:sp>
-        <p:nvSpPr>
-          <p:cNvPr id="207" name="Google Shape;207;p48"/>
-          <p:cNvSpPr txBox="1">
-            <a:spLocks noGrp="1"/>
-          </p:cNvSpPr>
-          <p:nvPr>
-            <p:ph type="subTitle" idx="1"/>
-          </p:nvPr>
-        </p:nvSpPr>
-        <p:spPr>
-          <a:xfrm>
-            <a:off x="500550" y="520133"/>
-            <a:ext cx="7796700" cy="356926"/>
-          </a:xfrm>
-          <a:prstGeom prst="rect">
-            <a:avLst/>
-          </a:prstGeom>
-        </p:spPr>
-        <p:txBody>
-          <a:bodyPr spcFirstLastPara="1" wrap="square" lIns="91425" tIns="91425" rIns="91425" bIns="91425" anchor="t" anchorCtr="0">
-            <a:normAutofit fontScale="92500" lnSpcReduction="20000"/>
-          </a:bodyPr>
-          <a:lstStyle/>
-          <a:p>
-            <a:pPr marL="0" lvl="0" indent="0" algn="l" rtl="0">
-              <a:spcBef>
-                <a:spcPts val="0"/>
-              </a:spcBef>
-              <a:spcAft>
-                <a:spcPts val="0"/>
-              </a:spcAft>
-              <a:buNone/>
-            </a:pPr>
-            <a:r>
-              <a:rPr lang="ru" dirty="0"/>
-              <a:t>Тема вебинара</a:t>
-            </a:r>
-            <a:endParaRPr dirty="0"/>
-          </a:p>
-        </p:txBody>
-      </p:sp>
-      <p:sp>
-        <p:nvSpPr>
-          <p:cNvPr id="208" name="Google Shape;208;p48"/>
-          <p:cNvSpPr txBox="1">
-            <a:spLocks noGrp="1"/>
-          </p:cNvSpPr>
-          <p:nvPr>
-            <p:ph type="subTitle" idx="2"/>
-          </p:nvPr>
-        </p:nvSpPr>
-        <p:spPr>
-          <a:xfrm>
-            <a:off x="3082400" y="2703052"/>
-            <a:ext cx="5856300" cy="396900"/>
-          </a:xfrm>
-          <a:prstGeom prst="rect">
-            <a:avLst/>
-          </a:prstGeom>
-        </p:spPr>
-        <p:txBody>
-          <a:bodyPr spcFirstLastPara="1" wrap="square" lIns="91425" tIns="91425" rIns="91425" bIns="91425" anchor="t" anchorCtr="0">
-            <a:normAutofit lnSpcReduction="10000"/>
-          </a:bodyPr>
-          <a:lstStyle/>
-          <a:p>
-            <a:pPr marL="0" lvl="0" indent="0" algn="l" rtl="0">
-              <a:spcBef>
-                <a:spcPts val="0"/>
-              </a:spcBef>
-              <a:spcAft>
-                <a:spcPts val="0"/>
-              </a:spcAft>
-              <a:buNone/>
-            </a:pPr>
-            <a:r>
-              <a:rPr lang="ru" dirty="0"/>
-              <a:t>Игорь Стурейко</a:t>
-            </a:r>
-            <a:endParaRPr dirty="0"/>
-          </a:p>
-        </p:txBody>
-      </p:sp>
-      <p:sp>
-        <p:nvSpPr>
-          <p:cNvPr id="209" name="Google Shape;209;p48"/>
-          <p:cNvSpPr txBox="1">
-            <a:spLocks noGrp="1"/>
-          </p:cNvSpPr>
-          <p:nvPr>
-            <p:ph type="subTitle" idx="3"/>
-          </p:nvPr>
-        </p:nvSpPr>
-        <p:spPr>
-          <a:xfrm>
-            <a:off x="3082400" y="3162350"/>
-            <a:ext cx="5095500" cy="1524300"/>
-          </a:xfrm>
-          <a:prstGeom prst="rect">
-            <a:avLst/>
-          </a:prstGeom>
-        </p:spPr>
-        <p:txBody>
-          <a:bodyPr spcFirstLastPara="1" wrap="square" lIns="91425" tIns="91425" rIns="91425" bIns="91425" anchor="t" anchorCtr="0">
-            <a:normAutofit fontScale="85000" lnSpcReduction="20000"/>
-          </a:bodyPr>
-          <a:lstStyle/>
-          <a:p>
-            <a:pPr marL="0" marR="0" lvl="0" indent="0" algn="l" rtl="0">
-              <a:lnSpc>
-                <a:spcPct val="100000"/>
-              </a:lnSpc>
-              <a:spcBef>
-                <a:spcPts val="0"/>
-              </a:spcBef>
-              <a:spcAft>
-                <a:spcPts val="0"/>
-              </a:spcAft>
-              <a:buNone/>
-            </a:pPr>
-            <a:r>
-              <a:rPr lang="en-US" sz="1150" b="1" dirty="0" err="1"/>
-              <a:t>Teamlead</a:t>
-            </a:r>
-            <a:r>
-              <a:rPr lang="ru-RU" sz="1150" b="1" dirty="0"/>
-              <a:t>, главный инженер проекта –</a:t>
-            </a:r>
-            <a:r>
-              <a:rPr lang="en-US" sz="1150" b="1" dirty="0"/>
-              <a:t> </a:t>
-            </a:r>
-            <a:r>
-              <a:rPr lang="ru-RU" sz="1150" b="1" dirty="0" err="1"/>
-              <a:t>НИИгазэкономика</a:t>
-            </a:r>
-            <a:endParaRPr sz="1150" b="1" dirty="0"/>
-          </a:p>
-          <a:p>
-            <a:pPr marL="0" marR="0" lvl="0" indent="0" algn="l" rtl="0">
-              <a:lnSpc>
-                <a:spcPct val="100000"/>
-              </a:lnSpc>
-              <a:spcBef>
-                <a:spcPts val="0"/>
-              </a:spcBef>
-              <a:spcAft>
-                <a:spcPts val="0"/>
-              </a:spcAft>
-              <a:buNone/>
-            </a:pPr>
-            <a:endParaRPr sz="1150" dirty="0"/>
-          </a:p>
-          <a:p>
-            <a:pPr marL="0" marR="0" lvl="0" indent="0" algn="l" rtl="0">
-              <a:lnSpc>
-                <a:spcPct val="100000"/>
-              </a:lnSpc>
-              <a:spcBef>
-                <a:spcPts val="0"/>
-              </a:spcBef>
-              <a:spcAft>
-                <a:spcPts val="0"/>
-              </a:spcAft>
-              <a:buNone/>
-            </a:pPr>
-            <a:r>
-              <a:rPr lang="ru" sz="1150" b="1" dirty="0"/>
-              <a:t>Опыт:</a:t>
-            </a:r>
-            <a:endParaRPr sz="1150" dirty="0"/>
-          </a:p>
-          <a:p>
-            <a:pPr marL="0" marR="0" lvl="0" indent="0" algn="l" rtl="0">
-              <a:lnSpc>
-                <a:spcPct val="100000"/>
-              </a:lnSpc>
-              <a:spcBef>
-                <a:spcPts val="0"/>
-              </a:spcBef>
-              <a:spcAft>
-                <a:spcPts val="0"/>
-              </a:spcAft>
-              <a:buNone/>
-            </a:pPr>
-            <a:r>
-              <a:rPr lang="ru-RU" sz="1150" dirty="0"/>
-              <a:t>Б</a:t>
-            </a:r>
-            <a:r>
-              <a:rPr lang="ru" sz="1150" dirty="0"/>
-              <a:t>олее 15 лет занимался прикладной математикой и мат моделированием</a:t>
-            </a:r>
-          </a:p>
-          <a:p>
-            <a:pPr marL="0" marR="0" lvl="0" indent="0" algn="l" rtl="0">
-              <a:lnSpc>
-                <a:spcPct val="100000"/>
-              </a:lnSpc>
-              <a:spcBef>
-                <a:spcPts val="0"/>
-              </a:spcBef>
-              <a:spcAft>
-                <a:spcPts val="0"/>
-              </a:spcAft>
-              <a:buNone/>
-            </a:pPr>
-            <a:r>
-              <a:rPr lang="ru" sz="1150" dirty="0"/>
-              <a:t>(Data Scientist) (Python, С++) в НИИ ПАО Газпром</a:t>
-            </a:r>
-            <a:endParaRPr sz="1150" dirty="0"/>
-          </a:p>
-          <a:p>
-            <a:pPr marL="0" marR="0" lvl="0" indent="0" algn="l" rtl="0">
-              <a:lnSpc>
-                <a:spcPct val="100000"/>
-              </a:lnSpc>
-              <a:spcBef>
-                <a:spcPts val="0"/>
-              </a:spcBef>
-              <a:spcAft>
-                <a:spcPts val="0"/>
-              </a:spcAft>
-              <a:buNone/>
-            </a:pPr>
-            <a:endParaRPr sz="1150" dirty="0"/>
-          </a:p>
-          <a:p>
-            <a:pPr marL="0" marR="0" lvl="0" indent="0" algn="l" rtl="0">
-              <a:lnSpc>
-                <a:spcPct val="100000"/>
-              </a:lnSpc>
-              <a:spcBef>
-                <a:spcPts val="0"/>
-              </a:spcBef>
-              <a:spcAft>
-                <a:spcPts val="0"/>
-              </a:spcAft>
-              <a:buNone/>
-            </a:pPr>
-            <a:r>
-              <a:rPr lang="ru" sz="1150" dirty="0"/>
-              <a:t>Анализ временных рядов, эволюционное развитие сложных систем</a:t>
-            </a:r>
-            <a:endParaRPr sz="1150" dirty="0"/>
-          </a:p>
-          <a:p>
-            <a:pPr marL="0" marR="0" lvl="0" indent="0" algn="l" rtl="0">
-              <a:lnSpc>
-                <a:spcPct val="100000"/>
-              </a:lnSpc>
-              <a:spcBef>
-                <a:spcPts val="0"/>
-              </a:spcBef>
-              <a:spcAft>
-                <a:spcPts val="0"/>
-              </a:spcAft>
-              <a:buNone/>
-            </a:pPr>
-            <a:endParaRPr sz="1150" dirty="0"/>
-          </a:p>
-          <a:p>
-            <a:pPr marL="0" marR="0" lvl="0" indent="0" algn="l" rtl="0">
-              <a:lnSpc>
-                <a:spcPct val="100000"/>
-              </a:lnSpc>
-              <a:spcBef>
-                <a:spcPts val="0"/>
-              </a:spcBef>
-              <a:spcAft>
-                <a:spcPts val="0"/>
-              </a:spcAft>
-              <a:buNone/>
-            </a:pPr>
-            <a:r>
-              <a:rPr lang="ru-RU" sz="1150" b="1" dirty="0"/>
-              <a:t>+7 (916) 156-07-82 (</a:t>
-            </a:r>
-            <a:r>
-              <a:rPr lang="en-US" sz="1150" b="1" dirty="0" err="1"/>
-              <a:t>whatsapp</a:t>
-            </a:r>
-            <a:r>
-              <a:rPr lang="en-US" sz="1150" b="1" dirty="0"/>
-              <a:t>)</a:t>
-            </a:r>
-          </a:p>
-          <a:p>
-            <a:pPr marL="0" marR="0" lvl="0" indent="0" algn="l" rtl="0">
-              <a:lnSpc>
-                <a:spcPct val="100000"/>
-              </a:lnSpc>
-              <a:spcBef>
-                <a:spcPts val="0"/>
-              </a:spcBef>
-              <a:spcAft>
-                <a:spcPts val="0"/>
-              </a:spcAft>
-              <a:buNone/>
-            </a:pPr>
-            <a:endParaRPr lang="en-US" sz="1150" b="1" dirty="0"/>
-          </a:p>
-          <a:p>
-            <a:pPr marL="0" marR="0" lvl="0" indent="0" algn="l" rtl="0">
-              <a:lnSpc>
-                <a:spcPct val="100000"/>
-              </a:lnSpc>
-              <a:spcBef>
-                <a:spcPts val="0"/>
-              </a:spcBef>
-              <a:spcAft>
-                <a:spcPts val="0"/>
-              </a:spcAft>
-              <a:buNone/>
-            </a:pPr>
-            <a:r>
-              <a:rPr lang="en-US" sz="1150" b="1" dirty="0"/>
-              <a:t>@</a:t>
-            </a:r>
-            <a:r>
-              <a:rPr lang="en-US" sz="1150" b="1" dirty="0" err="1"/>
-              <a:t>stureiko</a:t>
-            </a:r>
-            <a:r>
-              <a:rPr lang="en-US" sz="1150" b="1" dirty="0"/>
-              <a:t> (TG)</a:t>
-            </a:r>
-            <a:endParaRPr sz="1150" b="1" dirty="0"/>
-          </a:p>
-          <a:p>
-            <a:pPr marL="0" marR="0" lvl="0" indent="0" algn="l" rtl="0">
-              <a:lnSpc>
-                <a:spcPct val="100000"/>
-              </a:lnSpc>
-              <a:spcBef>
-                <a:spcPts val="0"/>
-              </a:spcBef>
-              <a:spcAft>
-                <a:spcPts val="0"/>
-              </a:spcAft>
-              <a:buNone/>
-            </a:pPr>
-            <a:endParaRPr sz="1400" dirty="0"/>
-          </a:p>
-        </p:txBody>
-      </p:sp>
-      <p:sp>
-        <p:nvSpPr>
-          <p:cNvPr id="5" name="Oval 4">
-            <a:extLst>
-              <a:ext uri="{FF2B5EF4-FFF2-40B4-BE49-F238E27FC236}">
-                <a16:creationId xmlns:a16="http://schemas.microsoft.com/office/drawing/2014/main" id="{499A103C-F3B2-9942-BE61-45E26582D7F9}"/>
-              </a:ext>
-            </a:extLst>
-          </p:cNvPr>
-          <p:cNvSpPr/>
-          <p:nvPr/>
-        </p:nvSpPr>
-        <p:spPr>
-          <a:xfrm>
-            <a:off x="827107" y="2871470"/>
-            <a:ext cx="1673385" cy="1646760"/>
-          </a:xfrm>
-          <a:prstGeom prst="ellipse">
-            <a:avLst/>
-          </a:prstGeom>
-          <a:blipFill>
-            <a:blip r:embed="rId3"/>
-            <a:stretch>
-              <a:fillRect/>
-            </a:stretch>
-          </a:blipFill>
-          <a:ln w="12700">
-            <a:solidFill>
-              <a:schemeClr val="tx1"/>
-            </a:solidFill>
-          </a:ln>
-        </p:spPr>
-        <p:style>
-          <a:lnRef idx="2">
-            <a:schemeClr val="accent1">
-              <a:shade val="50000"/>
-            </a:schemeClr>
-          </a:lnRef>
-          <a:fillRef idx="1">
-            <a:schemeClr val="accent1"/>
-          </a:fillRef>
-          <a:effectRef idx="0">
-            <a:schemeClr val="accent1"/>
-          </a:effectRef>
-          <a:fontRef idx="minor">
-            <a:schemeClr val="lt1"/>
-          </a:fontRef>
-        </p:style>
-        <p:txBody>
-          <a:bodyPr rtlCol="0" anchor="ctr"/>
-          <a:lstStyle/>
-          <a:p>
-            <a:pPr algn="ctr"/>
-            <a:endParaRPr lang="en-RU"/>
-          </a:p>
-        </p:txBody>
-      </p:sp>
-    </p:spTree>
-  </p:cSld>
-  <p:clrMapOvr>
-    <a:masterClrMapping/>
-  </p:clrMapOvr>
-</p:sld>
-</file>
-
-<file path=ppt/slides/slide30.xml><?xml version="1.0" encoding="utf-8"?>
+<file path=ppt/slides/slide31.xml><?xml version="1.0" encoding="utf-8"?>
 <p:sld xmlns:a="http://schemas.openxmlformats.org/drawingml/2006/main" xmlns:r="http://schemas.openxmlformats.org/officeDocument/2006/relationships" xmlns:p="http://schemas.openxmlformats.org/presentationml/2006/main">
   <p:cSld>
     <p:spTree>
@@ -37269,8 +38214,8 @@
           </a:p>
         </p:txBody>
       </p:sp>
-      <mc:AlternateContent xmlns:mc="http://schemas.openxmlformats.org/markup-compatibility/2006" xmlns:a14="http://schemas.microsoft.com/office/drawing/2010/main">
-        <mc:Choice Requires="a14">
+      <mc:AlternateContent xmlns:mc="http://schemas.openxmlformats.org/markup-compatibility/2006">
+        <mc:Choice xmlns:a14="http://schemas.microsoft.com/office/drawing/2010/main" Requires="a14">
           <p:sp>
             <p:nvSpPr>
               <p:cNvPr id="2" name="TextBox 1">
@@ -37286,7 +38231,7 @@
             <p:spPr>
               <a:xfrm>
                 <a:off x="500550" y="1102140"/>
-                <a:ext cx="7795917" cy="847091"/>
+                <a:ext cx="7887544" cy="847091"/>
               </a:xfrm>
               <a:prstGeom prst="rect">
                 <a:avLst/>
@@ -37339,7 +38284,7 @@
                                 <a:rPr lang="en-US" sz="2000" b="0" i="1" smtClean="0">
                                   <a:latin typeface="Cambria Math" panose="02040503050406030204" pitchFamily="18" charset="0"/>
                                 </a:rPr>
-                                <m:t>𝑥</m:t>
+                                <m:t>𝑦</m:t>
                               </m:r>
                             </m:e>
                             <m:e>
@@ -37347,7 +38292,7 @@
                                 <a:rPr lang="en-US" sz="2000" b="0" i="1" smtClean="0">
                                   <a:latin typeface="Cambria Math" panose="02040503050406030204" pitchFamily="18" charset="0"/>
                                 </a:rPr>
-                                <m:t>𝑦</m:t>
+                                <m:t>𝑥</m:t>
                               </m:r>
                               <m:r>
                                 <a:rPr lang="en-US" sz="2000" b="0" i="1" smtClean="0">
@@ -37523,7 +38468,7 @@
                                     <a:rPr lang="en-US" sz="2000" b="0" i="1" smtClean="0">
                                       <a:latin typeface="Cambria Math" panose="02040503050406030204" pitchFamily="18" charset="0"/>
                                     </a:rPr>
-                                    <m:t>𝑥</m:t>
+                                    <m:t>𝑦</m:t>
                                   </m:r>
                                 </m:e>
                                 <m:e>
@@ -37531,7 +38476,7 @@
                                     <a:rPr lang="en-US" sz="2000" b="0" i="1" smtClean="0">
                                       <a:latin typeface="Cambria Math" panose="02040503050406030204" pitchFamily="18" charset="0"/>
                                     </a:rPr>
-                                    <m:t>𝑦</m:t>
+                                    <m:t>𝑥</m:t>
                                   </m:r>
                                   <m:r>
                                     <a:rPr lang="en-US" sz="2000" b="0" i="1" smtClean="0">
@@ -37683,7 +38628,7 @@
             </p:txBody>
           </p:sp>
         </mc:Choice>
-        <mc:Fallback xmlns="">
+        <mc:Fallback>
           <p:sp>
             <p:nvSpPr>
               <p:cNvPr id="2" name="TextBox 1">
@@ -37701,7 +38646,7 @@
             <p:spPr>
               <a:xfrm>
                 <a:off x="500550" y="1102140"/>
-                <a:ext cx="7795917" cy="847091"/>
+                <a:ext cx="7887544" cy="847091"/>
               </a:xfrm>
               <a:prstGeom prst="rect">
                 <a:avLst/>
@@ -37709,7 +38654,7 @@
               <a:blipFill>
                 <a:blip r:embed="rId3"/>
                 <a:stretch>
-                  <a:fillRect l="-13171" t="-145588" r="-488" b="-198529"/>
+                  <a:fillRect l="-12379" t="-145588" b="-198529"/>
                 </a:stretch>
               </a:blipFill>
             </p:spPr>
@@ -38115,7 +39060,7 @@
 </p:sld>
 </file>
 
-<file path=ppt/slides/slide31.xml><?xml version="1.0" encoding="utf-8"?>
+<file path=ppt/slides/slide32.xml><?xml version="1.0" encoding="utf-8"?>
 <p:sld xmlns:a="http://schemas.openxmlformats.org/drawingml/2006/main" xmlns:r="http://schemas.openxmlformats.org/officeDocument/2006/relationships" xmlns:p="http://schemas.openxmlformats.org/presentationml/2006/main">
   <p:cSld>
     <p:spTree>
@@ -38718,7 +39663,7 @@
 </p:sld>
 </file>
 
-<file path=ppt/slides/slide32.xml><?xml version="1.0" encoding="utf-8"?>
+<file path=ppt/slides/slide33.xml><?xml version="1.0" encoding="utf-8"?>
 <p:sld xmlns:a="http://schemas.openxmlformats.org/drawingml/2006/main" xmlns:r="http://schemas.openxmlformats.org/officeDocument/2006/relationships" xmlns:p="http://schemas.openxmlformats.org/presentationml/2006/main">
   <p:cSld>
     <p:spTree>
@@ -39359,7 +40304,7 @@
 </p:sld>
 </file>
 
-<file path=ppt/slides/slide33.xml><?xml version="1.0" encoding="utf-8"?>
+<file path=ppt/slides/slide34.xml><?xml version="1.0" encoding="utf-8"?>
 <p:sld xmlns:a="http://schemas.openxmlformats.org/drawingml/2006/main" xmlns:r="http://schemas.openxmlformats.org/officeDocument/2006/relationships" xmlns:p="http://schemas.openxmlformats.org/presentationml/2006/main">
   <p:cSld>
     <p:spTree>
@@ -39426,7 +40371,7 @@
 </p:sld>
 </file>
 
-<file path=ppt/slides/slide34.xml><?xml version="1.0" encoding="utf-8"?>
+<file path=ppt/slides/slide35.xml><?xml version="1.0" encoding="utf-8"?>
 <p:sld xmlns:a="http://schemas.openxmlformats.org/drawingml/2006/main" xmlns:r="http://schemas.openxmlformats.org/officeDocument/2006/relationships" xmlns:p="http://schemas.openxmlformats.org/presentationml/2006/main">
   <p:cSld>
     <p:spTree>
@@ -39887,7 +40832,7 @@
 </p:sld>
 </file>
 
-<file path=ppt/slides/slide35.xml><?xml version="1.0" encoding="utf-8"?>
+<file path=ppt/slides/slide36.xml><?xml version="1.0" encoding="utf-8"?>
 <p:sld xmlns:a="http://schemas.openxmlformats.org/drawingml/2006/main" xmlns:r="http://schemas.openxmlformats.org/officeDocument/2006/relationships" xmlns:p="http://schemas.openxmlformats.org/presentationml/2006/main">
   <p:cSld>
     <p:spTree>
@@ -40236,7 +41181,7 @@
 </p:sld>
 </file>
 
-<file path=ppt/slides/slide36.xml><?xml version="1.0" encoding="utf-8"?>
+<file path=ppt/slides/slide37.xml><?xml version="1.0" encoding="utf-8"?>
 <p:sld xmlns:a="http://schemas.openxmlformats.org/drawingml/2006/main" xmlns:r="http://schemas.openxmlformats.org/officeDocument/2006/relationships" xmlns:p="http://schemas.openxmlformats.org/presentationml/2006/main">
   <p:cSld>
     <p:spTree>
@@ -40396,7 +41341,7 @@
 </p:sld>
 </file>
 
-<file path=ppt/slides/slide37.xml><?xml version="1.0" encoding="utf-8"?>
+<file path=ppt/slides/slide38.xml><?xml version="1.0" encoding="utf-8"?>
 <p:sld xmlns:a="http://schemas.openxmlformats.org/drawingml/2006/main" xmlns:r="http://schemas.openxmlformats.org/officeDocument/2006/relationships" xmlns:p="http://schemas.openxmlformats.org/presentationml/2006/main">
   <p:cSld>
     <p:spTree>
@@ -40697,7 +41642,7 @@
 </p:sld>
 </file>
 
-<file path=ppt/slides/slide38.xml><?xml version="1.0" encoding="utf-8"?>
+<file path=ppt/slides/slide39.xml><?xml version="1.0" encoding="utf-8"?>
 <p:sld xmlns:a="http://schemas.openxmlformats.org/drawingml/2006/main" xmlns:r="http://schemas.openxmlformats.org/officeDocument/2006/relationships" xmlns:p="http://schemas.openxmlformats.org/presentationml/2006/main">
   <p:cSld>
     <p:spTree>
@@ -40880,110 +41825,6 @@
           </a:ln>
         </p:spPr>
       </p:pic>
-    </p:spTree>
-  </p:cSld>
-  <p:clrMapOvr>
-    <a:masterClrMapping/>
-  </p:clrMapOvr>
-</p:sld>
-</file>
-
-<file path=ppt/slides/slide39.xml><?xml version="1.0" encoding="utf-8"?>
-<p:sld xmlns:a="http://schemas.openxmlformats.org/drawingml/2006/main" xmlns:r="http://schemas.openxmlformats.org/officeDocument/2006/relationships" xmlns:p="http://schemas.openxmlformats.org/presentationml/2006/main">
-  <p:cSld>
-    <p:spTree>
-      <p:nvGrpSpPr>
-        <p:cNvPr id="1" name="Shape 474"/>
-        <p:cNvGrpSpPr/>
-        <p:nvPr/>
-      </p:nvGrpSpPr>
-      <p:grpSpPr>
-        <a:xfrm>
-          <a:off x="0" y="0"/>
-          <a:ext cx="0" cy="0"/>
-          <a:chOff x="0" y="0"/>
-          <a:chExt cx="0" cy="0"/>
-        </a:xfrm>
-      </p:grpSpPr>
-      <p:sp>
-        <p:nvSpPr>
-          <p:cNvPr id="475" name="Google Shape;475;p79"/>
-          <p:cNvSpPr txBox="1">
-            <a:spLocks noGrp="1"/>
-          </p:cNvSpPr>
-          <p:nvPr>
-            <p:ph type="title"/>
-          </p:nvPr>
-        </p:nvSpPr>
-        <p:spPr>
-          <a:xfrm>
-            <a:off x="956225" y="396394"/>
-            <a:ext cx="7559100" cy="4090800"/>
-          </a:xfrm>
-          <a:prstGeom prst="rect">
-            <a:avLst/>
-          </a:prstGeom>
-        </p:spPr>
-        <p:txBody>
-          <a:bodyPr spcFirstLastPara="1" wrap="square" lIns="91425" tIns="91425" rIns="91425" bIns="91425" anchor="ctr" anchorCtr="0">
-            <a:noAutofit/>
-          </a:bodyPr>
-          <a:lstStyle/>
-          <a:p>
-            <a:pPr marL="0" lvl="0" indent="0" algn="l" rtl="0">
-              <a:spcBef>
-                <a:spcPts val="0"/>
-              </a:spcBef>
-              <a:spcAft>
-                <a:spcPts val="0"/>
-              </a:spcAft>
-              <a:buClr>
-                <a:schemeClr val="dk1"/>
-              </a:buClr>
-              <a:buSzPts val="1100"/>
-              <a:buFont typeface="Arial"/>
-              <a:buNone/>
-            </a:pPr>
-            <a:r>
-              <a:rPr lang="ru" sz="3800"/>
-              <a:t>Заполните, пожалуйста,</a:t>
-            </a:r>
-            <a:endParaRPr sz="3800"/>
-          </a:p>
-          <a:p>
-            <a:pPr marL="0" lvl="0" indent="0" algn="l" rtl="0">
-              <a:spcBef>
-                <a:spcPts val="0"/>
-              </a:spcBef>
-              <a:spcAft>
-                <a:spcPts val="0"/>
-              </a:spcAft>
-              <a:buNone/>
-            </a:pPr>
-            <a:r>
-              <a:rPr lang="ru" sz="3800"/>
-              <a:t>опрос о занятии</a:t>
-            </a:r>
-            <a:endParaRPr sz="3800"/>
-          </a:p>
-          <a:p>
-            <a:pPr marL="0" lvl="0" indent="0" algn="l" rtl="0">
-              <a:spcBef>
-                <a:spcPts val="0"/>
-              </a:spcBef>
-              <a:spcAft>
-                <a:spcPts val="0"/>
-              </a:spcAft>
-              <a:buNone/>
-            </a:pPr>
-            <a:r>
-              <a:rPr lang="ru" sz="3800"/>
-              <a:t>по ссылке в чате</a:t>
-            </a:r>
-            <a:endParaRPr sz="3800"/>
-          </a:p>
-        </p:txBody>
-      </p:sp>
     </p:spTree>
   </p:cSld>
   <p:clrMapOvr>
@@ -42219,6 +43060,110 @@
 </file>
 
 <file path=ppt/slides/slide40.xml><?xml version="1.0" encoding="utf-8"?>
+<p:sld xmlns:a="http://schemas.openxmlformats.org/drawingml/2006/main" xmlns:r="http://schemas.openxmlformats.org/officeDocument/2006/relationships" xmlns:p="http://schemas.openxmlformats.org/presentationml/2006/main">
+  <p:cSld>
+    <p:spTree>
+      <p:nvGrpSpPr>
+        <p:cNvPr id="1" name="Shape 474"/>
+        <p:cNvGrpSpPr/>
+        <p:nvPr/>
+      </p:nvGrpSpPr>
+      <p:grpSpPr>
+        <a:xfrm>
+          <a:off x="0" y="0"/>
+          <a:ext cx="0" cy="0"/>
+          <a:chOff x="0" y="0"/>
+          <a:chExt cx="0" cy="0"/>
+        </a:xfrm>
+      </p:grpSpPr>
+      <p:sp>
+        <p:nvSpPr>
+          <p:cNvPr id="475" name="Google Shape;475;p79"/>
+          <p:cNvSpPr txBox="1">
+            <a:spLocks noGrp="1"/>
+          </p:cNvSpPr>
+          <p:nvPr>
+            <p:ph type="title"/>
+          </p:nvPr>
+        </p:nvSpPr>
+        <p:spPr>
+          <a:xfrm>
+            <a:off x="956225" y="396394"/>
+            <a:ext cx="7559100" cy="4090800"/>
+          </a:xfrm>
+          <a:prstGeom prst="rect">
+            <a:avLst/>
+          </a:prstGeom>
+        </p:spPr>
+        <p:txBody>
+          <a:bodyPr spcFirstLastPara="1" wrap="square" lIns="91425" tIns="91425" rIns="91425" bIns="91425" anchor="ctr" anchorCtr="0">
+            <a:noAutofit/>
+          </a:bodyPr>
+          <a:lstStyle/>
+          <a:p>
+            <a:pPr marL="0" lvl="0" indent="0" algn="l" rtl="0">
+              <a:spcBef>
+                <a:spcPts val="0"/>
+              </a:spcBef>
+              <a:spcAft>
+                <a:spcPts val="0"/>
+              </a:spcAft>
+              <a:buClr>
+                <a:schemeClr val="dk1"/>
+              </a:buClr>
+              <a:buSzPts val="1100"/>
+              <a:buFont typeface="Arial"/>
+              <a:buNone/>
+            </a:pPr>
+            <a:r>
+              <a:rPr lang="ru" sz="3800"/>
+              <a:t>Заполните, пожалуйста,</a:t>
+            </a:r>
+            <a:endParaRPr sz="3800"/>
+          </a:p>
+          <a:p>
+            <a:pPr marL="0" lvl="0" indent="0" algn="l" rtl="0">
+              <a:spcBef>
+                <a:spcPts val="0"/>
+              </a:spcBef>
+              <a:spcAft>
+                <a:spcPts val="0"/>
+              </a:spcAft>
+              <a:buNone/>
+            </a:pPr>
+            <a:r>
+              <a:rPr lang="ru" sz="3800"/>
+              <a:t>опрос о занятии</a:t>
+            </a:r>
+            <a:endParaRPr sz="3800"/>
+          </a:p>
+          <a:p>
+            <a:pPr marL="0" lvl="0" indent="0" algn="l" rtl="0">
+              <a:spcBef>
+                <a:spcPts val="0"/>
+              </a:spcBef>
+              <a:spcAft>
+                <a:spcPts val="0"/>
+              </a:spcAft>
+              <a:buNone/>
+            </a:pPr>
+            <a:r>
+              <a:rPr lang="ru" sz="3800"/>
+              <a:t>по ссылке в чате</a:t>
+            </a:r>
+            <a:endParaRPr sz="3800"/>
+          </a:p>
+        </p:txBody>
+      </p:sp>
+    </p:spTree>
+  </p:cSld>
+  <p:clrMapOvr>
+    <a:masterClrMapping/>
+  </p:clrMapOvr>
+</p:sld>
+</file>
+
+<file path=ppt/slides/slide41.xml><?xml version="1.0" encoding="utf-8"?>
 <p:sld xmlns:a="http://schemas.openxmlformats.org/drawingml/2006/main" xmlns:r="http://schemas.openxmlformats.org/officeDocument/2006/relationships" xmlns:p="http://schemas.openxmlformats.org/presentationml/2006/main">
   <p:cSld>
     <p:spTree>

</xml_diff>